<commit_message>
Added animations for the buttons, changed some colours, added version info amd added game description. Now checks for server at startup, if not up then disables the create game button and notifies the user
</commit_message>
<xml_diff>
--- a/Documentation/Host Main Game Screen.pptx
+++ b/Documentation/Host Main Game Screen.pptx
@@ -5,7 +5,8 @@
     <p:sldMasterId id="2147483648" r:id="rId1"/>
   </p:sldMasterIdLst>
   <p:sldIdLst>
-    <p:sldId id="256" r:id="rId2"/>
+    <p:sldId id="257" r:id="rId2"/>
+    <p:sldId id="256" r:id="rId3"/>
   </p:sldIdLst>
   <p:sldSz cx="12192000" cy="6858000"/>
   <p:notesSz cx="6858000" cy="9144000"/>
@@ -104,6 +105,11 @@
       </a:defRPr>
     </a:lvl9pPr>
   </p:defaultTextStyle>
+  <p:extLst>
+    <p:ext uri="{EFAFB233-063F-42B5-8137-9DF3F51BA10A}">
+      <p15:sldGuideLst xmlns:p15="http://schemas.microsoft.com/office/powerpoint/2012/main"/>
+    </p:ext>
+  </p:extLst>
 </p:presentation>
 </file>
 
@@ -256,7 +262,7 @@
           <a:p>
             <a:fld id="{ED8D0E25-5DB8-471D-A76A-627DA246F623}" type="datetimeFigureOut">
               <a:rPr lang="en-GB" smtClean="0"/>
-              <a:t>15/01/2026</a:t>
+              <a:t>16/01/2026</a:t>
             </a:fld>
             <a:endParaRPr lang="en-GB"/>
           </a:p>
@@ -456,7 +462,7 @@
           <a:p>
             <a:fld id="{ED8D0E25-5DB8-471D-A76A-627DA246F623}" type="datetimeFigureOut">
               <a:rPr lang="en-GB" smtClean="0"/>
-              <a:t>15/01/2026</a:t>
+              <a:t>16/01/2026</a:t>
             </a:fld>
             <a:endParaRPr lang="en-GB"/>
           </a:p>
@@ -666,7 +672,7 @@
           <a:p>
             <a:fld id="{ED8D0E25-5DB8-471D-A76A-627DA246F623}" type="datetimeFigureOut">
               <a:rPr lang="en-GB" smtClean="0"/>
-              <a:t>15/01/2026</a:t>
+              <a:t>16/01/2026</a:t>
             </a:fld>
             <a:endParaRPr lang="en-GB"/>
           </a:p>
@@ -866,7 +872,7 @@
           <a:p>
             <a:fld id="{ED8D0E25-5DB8-471D-A76A-627DA246F623}" type="datetimeFigureOut">
               <a:rPr lang="en-GB" smtClean="0"/>
-              <a:t>15/01/2026</a:t>
+              <a:t>16/01/2026</a:t>
             </a:fld>
             <a:endParaRPr lang="en-GB"/>
           </a:p>
@@ -1142,7 +1148,7 @@
           <a:p>
             <a:fld id="{ED8D0E25-5DB8-471D-A76A-627DA246F623}" type="datetimeFigureOut">
               <a:rPr lang="en-GB" smtClean="0"/>
-              <a:t>15/01/2026</a:t>
+              <a:t>16/01/2026</a:t>
             </a:fld>
             <a:endParaRPr lang="en-GB"/>
           </a:p>
@@ -1410,7 +1416,7 @@
           <a:p>
             <a:fld id="{ED8D0E25-5DB8-471D-A76A-627DA246F623}" type="datetimeFigureOut">
               <a:rPr lang="en-GB" smtClean="0"/>
-              <a:t>15/01/2026</a:t>
+              <a:t>16/01/2026</a:t>
             </a:fld>
             <a:endParaRPr lang="en-GB"/>
           </a:p>
@@ -1825,7 +1831,7 @@
           <a:p>
             <a:fld id="{ED8D0E25-5DB8-471D-A76A-627DA246F623}" type="datetimeFigureOut">
               <a:rPr lang="en-GB" smtClean="0"/>
-              <a:t>15/01/2026</a:t>
+              <a:t>16/01/2026</a:t>
             </a:fld>
             <a:endParaRPr lang="en-GB"/>
           </a:p>
@@ -1967,7 +1973,7 @@
           <a:p>
             <a:fld id="{ED8D0E25-5DB8-471D-A76A-627DA246F623}" type="datetimeFigureOut">
               <a:rPr lang="en-GB" smtClean="0"/>
-              <a:t>15/01/2026</a:t>
+              <a:t>16/01/2026</a:t>
             </a:fld>
             <a:endParaRPr lang="en-GB"/>
           </a:p>
@@ -2080,7 +2086,7 @@
           <a:p>
             <a:fld id="{ED8D0E25-5DB8-471D-A76A-627DA246F623}" type="datetimeFigureOut">
               <a:rPr lang="en-GB" smtClean="0"/>
-              <a:t>15/01/2026</a:t>
+              <a:t>16/01/2026</a:t>
             </a:fld>
             <a:endParaRPr lang="en-GB"/>
           </a:p>
@@ -2393,7 +2399,7 @@
           <a:p>
             <a:fld id="{ED8D0E25-5DB8-471D-A76A-627DA246F623}" type="datetimeFigureOut">
               <a:rPr lang="en-GB" smtClean="0"/>
-              <a:t>15/01/2026</a:t>
+              <a:t>16/01/2026</a:t>
             </a:fld>
             <a:endParaRPr lang="en-GB"/>
           </a:p>
@@ -2682,7 +2688,7 @@
           <a:p>
             <a:fld id="{ED8D0E25-5DB8-471D-A76A-627DA246F623}" type="datetimeFigureOut">
               <a:rPr lang="en-GB" smtClean="0"/>
-              <a:t>15/01/2026</a:t>
+              <a:t>16/01/2026</a:t>
             </a:fld>
             <a:endParaRPr lang="en-GB"/>
           </a:p>
@@ -2925,7 +2931,7 @@
           <a:p>
             <a:fld id="{ED8D0E25-5DB8-471D-A76A-627DA246F623}" type="datetimeFigureOut">
               <a:rPr lang="en-GB" smtClean="0"/>
-              <a:t>15/01/2026</a:t>
+              <a:t>16/01/2026</a:t>
             </a:fld>
             <a:endParaRPr lang="en-GB"/>
           </a:p>
@@ -3326,6 +3332,2660 @@
 </file>
 
 <file path=ppt/slides/slide1.xml><?xml version="1.0" encoding="utf-8"?>
+<p:sld xmlns:a="http://schemas.openxmlformats.org/drawingml/2006/main" xmlns:r="http://schemas.openxmlformats.org/officeDocument/2006/relationships" xmlns:p="http://schemas.openxmlformats.org/presentationml/2006/main">
+  <p:cSld>
+    <p:spTree>
+      <p:nvGrpSpPr>
+        <p:cNvPr id="1" name=""/>
+        <p:cNvGrpSpPr/>
+        <p:nvPr/>
+      </p:nvGrpSpPr>
+      <p:grpSpPr>
+        <a:xfrm>
+          <a:off x="0" y="0"/>
+          <a:ext cx="0" cy="0"/>
+          <a:chOff x="0" y="0"/>
+          <a:chExt cx="0" cy="0"/>
+        </a:xfrm>
+      </p:grpSpPr>
+      <p:pic>
+        <p:nvPicPr>
+          <p:cNvPr id="4" name="Picture 6" descr="A Simplified, Yet Complex Solution (221B Baker Street) – Northern Dice">
+            <a:extLst>
+              <a:ext uri="{FF2B5EF4-FFF2-40B4-BE49-F238E27FC236}">
+                <a16:creationId xmlns:a16="http://schemas.microsoft.com/office/drawing/2014/main" id="{2AE8308C-F864-1547-FCE4-1C9B9FAC958A}"/>
+              </a:ext>
+            </a:extLst>
+          </p:cNvPr>
+          <p:cNvPicPr>
+            <a:picLocks noChangeAspect="1" noChangeArrowheads="1"/>
+          </p:cNvPicPr>
+          <p:nvPr/>
+        </p:nvPicPr>
+        <p:blipFill rotWithShape="1">
+          <a:blip r:embed="rId2">
+            <a:extLst>
+              <a:ext uri="{28A0092B-C50C-407E-A947-70E740481C1C}">
+                <a14:useLocalDpi xmlns:a14="http://schemas.microsoft.com/office/drawing/2010/main" val="0"/>
+              </a:ext>
+            </a:extLst>
+          </a:blip>
+          <a:srcRect t="26128"/>
+          <a:stretch>
+            <a:fillRect/>
+          </a:stretch>
+        </p:blipFill>
+        <p:spPr bwMode="auto">
+          <a:xfrm>
+            <a:off x="-419330" y="6105960"/>
+            <a:ext cx="2181198" cy="1089497"/>
+          </a:xfrm>
+          <a:prstGeom prst="rect">
+            <a:avLst/>
+          </a:prstGeom>
+          <a:noFill/>
+          <a:extLst>
+            <a:ext uri="{909E8E84-426E-40DD-AFC4-6F175D3DCCD1}">
+              <a14:hiddenFill xmlns:a14="http://schemas.microsoft.com/office/drawing/2010/main">
+                <a:solidFill>
+                  <a:srgbClr val="FFFFFF"/>
+                </a:solidFill>
+              </a14:hiddenFill>
+            </a:ext>
+          </a:extLst>
+        </p:spPr>
+      </p:pic>
+      <p:pic>
+        <p:nvPicPr>
+          <p:cNvPr id="5" name="Picture 6" descr="A Simplified, Yet Complex Solution (221B Baker Street) – Northern Dice">
+            <a:extLst>
+              <a:ext uri="{FF2B5EF4-FFF2-40B4-BE49-F238E27FC236}">
+                <a16:creationId xmlns:a16="http://schemas.microsoft.com/office/drawing/2014/main" id="{EE164BFC-63D8-AA92-7E04-0CEB2921791B}"/>
+              </a:ext>
+            </a:extLst>
+          </p:cNvPr>
+          <p:cNvPicPr>
+            <a:picLocks noChangeAspect="1" noChangeArrowheads="1"/>
+          </p:cNvPicPr>
+          <p:nvPr/>
+        </p:nvPicPr>
+        <p:blipFill rotWithShape="1">
+          <a:blip r:embed="rId2">
+            <a:extLst>
+              <a:ext uri="{28A0092B-C50C-407E-A947-70E740481C1C}">
+                <a14:useLocalDpi xmlns:a14="http://schemas.microsoft.com/office/drawing/2010/main" val="0"/>
+              </a:ext>
+            </a:extLst>
+          </a:blip>
+          <a:srcRect t="26128"/>
+          <a:stretch>
+            <a:fillRect/>
+          </a:stretch>
+        </p:blipFill>
+        <p:spPr bwMode="auto">
+          <a:xfrm>
+            <a:off x="6096000" y="6105960"/>
+            <a:ext cx="2181198" cy="1089497"/>
+          </a:xfrm>
+          <a:prstGeom prst="rect">
+            <a:avLst/>
+          </a:prstGeom>
+          <a:noFill/>
+          <a:extLst>
+            <a:ext uri="{909E8E84-426E-40DD-AFC4-6F175D3DCCD1}">
+              <a14:hiddenFill xmlns:a14="http://schemas.microsoft.com/office/drawing/2010/main">
+                <a:solidFill>
+                  <a:srgbClr val="FFFFFF"/>
+                </a:solidFill>
+              </a14:hiddenFill>
+            </a:ext>
+          </a:extLst>
+        </p:spPr>
+      </p:pic>
+      <p:pic>
+        <p:nvPicPr>
+          <p:cNvPr id="6" name="Picture 5" descr="A Simplified, Yet Complex Solution (221B Baker Street) – Northern Dice">
+            <a:extLst>
+              <a:ext uri="{FF2B5EF4-FFF2-40B4-BE49-F238E27FC236}">
+                <a16:creationId xmlns:a16="http://schemas.microsoft.com/office/drawing/2014/main" id="{1D92BCD5-1C79-E233-7C35-E1145233F501}"/>
+              </a:ext>
+            </a:extLst>
+          </p:cNvPr>
+          <p:cNvPicPr>
+            <a:picLocks noChangeAspect="1" noChangeArrowheads="1"/>
+          </p:cNvPicPr>
+          <p:nvPr/>
+        </p:nvPicPr>
+        <p:blipFill rotWithShape="1">
+          <a:blip r:embed="rId2">
+            <a:extLst>
+              <a:ext uri="{28A0092B-C50C-407E-A947-70E740481C1C}">
+                <a14:useLocalDpi xmlns:a14="http://schemas.microsoft.com/office/drawing/2010/main" val="0"/>
+              </a:ext>
+            </a:extLst>
+          </a:blip>
+          <a:srcRect t="26128"/>
+          <a:stretch>
+            <a:fillRect/>
+          </a:stretch>
+        </p:blipFill>
+        <p:spPr bwMode="auto">
+          <a:xfrm>
+            <a:off x="3914802" y="6105960"/>
+            <a:ext cx="2181198" cy="1089497"/>
+          </a:xfrm>
+          <a:prstGeom prst="rect">
+            <a:avLst/>
+          </a:prstGeom>
+          <a:noFill/>
+          <a:extLst>
+            <a:ext uri="{909E8E84-426E-40DD-AFC4-6F175D3DCCD1}">
+              <a14:hiddenFill xmlns:a14="http://schemas.microsoft.com/office/drawing/2010/main">
+                <a:solidFill>
+                  <a:srgbClr val="FFFFFF"/>
+                </a:solidFill>
+              </a14:hiddenFill>
+            </a:ext>
+          </a:extLst>
+        </p:spPr>
+      </p:pic>
+      <p:pic>
+        <p:nvPicPr>
+          <p:cNvPr id="7" name="Picture 6" descr="A Simplified, Yet Complex Solution (221B Baker Street) – Northern Dice">
+            <a:extLst>
+              <a:ext uri="{FF2B5EF4-FFF2-40B4-BE49-F238E27FC236}">
+                <a16:creationId xmlns:a16="http://schemas.microsoft.com/office/drawing/2014/main" id="{63D8AC4C-C69B-0656-78B3-43FF05C2C899}"/>
+              </a:ext>
+            </a:extLst>
+          </p:cNvPr>
+          <p:cNvPicPr>
+            <a:picLocks noChangeAspect="1" noChangeArrowheads="1"/>
+          </p:cNvPicPr>
+          <p:nvPr/>
+        </p:nvPicPr>
+        <p:blipFill rotWithShape="1">
+          <a:blip r:embed="rId2">
+            <a:extLst>
+              <a:ext uri="{28A0092B-C50C-407E-A947-70E740481C1C}">
+                <a14:useLocalDpi xmlns:a14="http://schemas.microsoft.com/office/drawing/2010/main" val="0"/>
+              </a:ext>
+            </a:extLst>
+          </a:blip>
+          <a:srcRect t="26128"/>
+          <a:stretch>
+            <a:fillRect/>
+          </a:stretch>
+        </p:blipFill>
+        <p:spPr bwMode="auto">
+          <a:xfrm>
+            <a:off x="1747736" y="6105958"/>
+            <a:ext cx="2181198" cy="1089497"/>
+          </a:xfrm>
+          <a:prstGeom prst="rect">
+            <a:avLst/>
+          </a:prstGeom>
+          <a:noFill/>
+          <a:extLst>
+            <a:ext uri="{909E8E84-426E-40DD-AFC4-6F175D3DCCD1}">
+              <a14:hiddenFill xmlns:a14="http://schemas.microsoft.com/office/drawing/2010/main">
+                <a:solidFill>
+                  <a:srgbClr val="FFFFFF"/>
+                </a:solidFill>
+              </a14:hiddenFill>
+            </a:ext>
+          </a:extLst>
+        </p:spPr>
+      </p:pic>
+      <p:pic>
+        <p:nvPicPr>
+          <p:cNvPr id="8" name="Picture 6" descr="A Simplified, Yet Complex Solution (221B Baker Street) – Northern Dice">
+            <a:extLst>
+              <a:ext uri="{FF2B5EF4-FFF2-40B4-BE49-F238E27FC236}">
+                <a16:creationId xmlns:a16="http://schemas.microsoft.com/office/drawing/2014/main" id="{9373B2AC-5212-388E-4ED6-F858DAD5A68D}"/>
+              </a:ext>
+            </a:extLst>
+          </p:cNvPr>
+          <p:cNvPicPr>
+            <a:picLocks noChangeAspect="1" noChangeArrowheads="1"/>
+          </p:cNvPicPr>
+          <p:nvPr/>
+        </p:nvPicPr>
+        <p:blipFill rotWithShape="1">
+          <a:blip r:embed="rId2">
+            <a:extLst>
+              <a:ext uri="{28A0092B-C50C-407E-A947-70E740481C1C}">
+                <a14:useLocalDpi xmlns:a14="http://schemas.microsoft.com/office/drawing/2010/main" val="0"/>
+              </a:ext>
+            </a:extLst>
+          </a:blip>
+          <a:srcRect t="26128"/>
+          <a:stretch>
+            <a:fillRect/>
+          </a:stretch>
+        </p:blipFill>
+        <p:spPr bwMode="auto">
+          <a:xfrm>
+            <a:off x="8248934" y="6105957"/>
+            <a:ext cx="2181198" cy="1089497"/>
+          </a:xfrm>
+          <a:prstGeom prst="rect">
+            <a:avLst/>
+          </a:prstGeom>
+          <a:noFill/>
+          <a:extLst>
+            <a:ext uri="{909E8E84-426E-40DD-AFC4-6F175D3DCCD1}">
+              <a14:hiddenFill xmlns:a14="http://schemas.microsoft.com/office/drawing/2010/main">
+                <a:solidFill>
+                  <a:srgbClr val="FFFFFF"/>
+                </a:solidFill>
+              </a14:hiddenFill>
+            </a:ext>
+          </a:extLst>
+        </p:spPr>
+      </p:pic>
+      <p:pic>
+        <p:nvPicPr>
+          <p:cNvPr id="9" name="Picture 6" descr="A Simplified, Yet Complex Solution (221B Baker Street) – Northern Dice">
+            <a:extLst>
+              <a:ext uri="{FF2B5EF4-FFF2-40B4-BE49-F238E27FC236}">
+                <a16:creationId xmlns:a16="http://schemas.microsoft.com/office/drawing/2014/main" id="{88F0BB49-5484-E5D4-9366-55C01C37C9E8}"/>
+              </a:ext>
+            </a:extLst>
+          </p:cNvPr>
+          <p:cNvPicPr>
+            <a:picLocks noChangeAspect="1" noChangeArrowheads="1"/>
+          </p:cNvPicPr>
+          <p:nvPr/>
+        </p:nvPicPr>
+        <p:blipFill rotWithShape="1">
+          <a:blip r:embed="rId2">
+            <a:extLst>
+              <a:ext uri="{28A0092B-C50C-407E-A947-70E740481C1C}">
+                <a14:useLocalDpi xmlns:a14="http://schemas.microsoft.com/office/drawing/2010/main" val="0"/>
+              </a:ext>
+            </a:extLst>
+          </a:blip>
+          <a:srcRect t="26128"/>
+          <a:stretch>
+            <a:fillRect/>
+          </a:stretch>
+        </p:blipFill>
+        <p:spPr bwMode="auto">
+          <a:xfrm>
+            <a:off x="10401868" y="6105960"/>
+            <a:ext cx="2181198" cy="1089497"/>
+          </a:xfrm>
+          <a:prstGeom prst="rect">
+            <a:avLst/>
+          </a:prstGeom>
+          <a:noFill/>
+          <a:extLst>
+            <a:ext uri="{909E8E84-426E-40DD-AFC4-6F175D3DCCD1}">
+              <a14:hiddenFill xmlns:a14="http://schemas.microsoft.com/office/drawing/2010/main">
+                <a:solidFill>
+                  <a:srgbClr val="FFFFFF"/>
+                </a:solidFill>
+              </a14:hiddenFill>
+            </a:ext>
+          </a:extLst>
+        </p:spPr>
+      </p:pic>
+      <p:pic>
+        <p:nvPicPr>
+          <p:cNvPr id="10" name="Picture 6" descr="A Simplified, Yet Complex Solution (221B Baker Street) – Northern Dice">
+            <a:extLst>
+              <a:ext uri="{FF2B5EF4-FFF2-40B4-BE49-F238E27FC236}">
+                <a16:creationId xmlns:a16="http://schemas.microsoft.com/office/drawing/2014/main" id="{20F5D22C-1233-BD34-7ADC-E737E2F08DA0}"/>
+              </a:ext>
+            </a:extLst>
+          </p:cNvPr>
+          <p:cNvPicPr>
+            <a:picLocks noChangeAspect="1" noChangeArrowheads="1"/>
+          </p:cNvPicPr>
+          <p:nvPr/>
+        </p:nvPicPr>
+        <p:blipFill rotWithShape="1">
+          <a:blip r:embed="rId2">
+            <a:extLst>
+              <a:ext uri="{28A0092B-C50C-407E-A947-70E740481C1C}">
+                <a14:useLocalDpi xmlns:a14="http://schemas.microsoft.com/office/drawing/2010/main" val="0"/>
+              </a:ext>
+            </a:extLst>
+          </a:blip>
+          <a:srcRect t="26128"/>
+          <a:stretch>
+            <a:fillRect/>
+          </a:stretch>
+        </p:blipFill>
+        <p:spPr bwMode="auto">
+          <a:xfrm>
+            <a:off x="-419330" y="5016457"/>
+            <a:ext cx="2181198" cy="1089497"/>
+          </a:xfrm>
+          <a:prstGeom prst="rect">
+            <a:avLst/>
+          </a:prstGeom>
+          <a:noFill/>
+          <a:extLst>
+            <a:ext uri="{909E8E84-426E-40DD-AFC4-6F175D3DCCD1}">
+              <a14:hiddenFill xmlns:a14="http://schemas.microsoft.com/office/drawing/2010/main">
+                <a:solidFill>
+                  <a:srgbClr val="FFFFFF"/>
+                </a:solidFill>
+              </a14:hiddenFill>
+            </a:ext>
+          </a:extLst>
+        </p:spPr>
+      </p:pic>
+      <p:pic>
+        <p:nvPicPr>
+          <p:cNvPr id="11" name="Picture 6" descr="A Simplified, Yet Complex Solution (221B Baker Street) – Northern Dice">
+            <a:extLst>
+              <a:ext uri="{FF2B5EF4-FFF2-40B4-BE49-F238E27FC236}">
+                <a16:creationId xmlns:a16="http://schemas.microsoft.com/office/drawing/2014/main" id="{6348CE7A-2A5A-949D-832D-6C30EE2F17E2}"/>
+              </a:ext>
+            </a:extLst>
+          </p:cNvPr>
+          <p:cNvPicPr>
+            <a:picLocks noChangeAspect="1" noChangeArrowheads="1"/>
+          </p:cNvPicPr>
+          <p:nvPr/>
+        </p:nvPicPr>
+        <p:blipFill rotWithShape="1">
+          <a:blip r:embed="rId2">
+            <a:extLst>
+              <a:ext uri="{28A0092B-C50C-407E-A947-70E740481C1C}">
+                <a14:useLocalDpi xmlns:a14="http://schemas.microsoft.com/office/drawing/2010/main" val="0"/>
+              </a:ext>
+            </a:extLst>
+          </a:blip>
+          <a:srcRect t="26128"/>
+          <a:stretch>
+            <a:fillRect/>
+          </a:stretch>
+        </p:blipFill>
+        <p:spPr bwMode="auto">
+          <a:xfrm>
+            <a:off x="6096000" y="5016457"/>
+            <a:ext cx="2181198" cy="1089497"/>
+          </a:xfrm>
+          <a:prstGeom prst="rect">
+            <a:avLst/>
+          </a:prstGeom>
+          <a:noFill/>
+          <a:extLst>
+            <a:ext uri="{909E8E84-426E-40DD-AFC4-6F175D3DCCD1}">
+              <a14:hiddenFill xmlns:a14="http://schemas.microsoft.com/office/drawing/2010/main">
+                <a:solidFill>
+                  <a:srgbClr val="FFFFFF"/>
+                </a:solidFill>
+              </a14:hiddenFill>
+            </a:ext>
+          </a:extLst>
+        </p:spPr>
+      </p:pic>
+      <p:pic>
+        <p:nvPicPr>
+          <p:cNvPr id="12" name="Picture 11" descr="A Simplified, Yet Complex Solution (221B Baker Street) – Northern Dice">
+            <a:extLst>
+              <a:ext uri="{FF2B5EF4-FFF2-40B4-BE49-F238E27FC236}">
+                <a16:creationId xmlns:a16="http://schemas.microsoft.com/office/drawing/2014/main" id="{0E30DA0D-7213-8EF5-F27A-2AABC3AFA4E8}"/>
+              </a:ext>
+            </a:extLst>
+          </p:cNvPr>
+          <p:cNvPicPr>
+            <a:picLocks noChangeAspect="1" noChangeArrowheads="1"/>
+          </p:cNvPicPr>
+          <p:nvPr/>
+        </p:nvPicPr>
+        <p:blipFill rotWithShape="1">
+          <a:blip r:embed="rId2">
+            <a:extLst>
+              <a:ext uri="{28A0092B-C50C-407E-A947-70E740481C1C}">
+                <a14:useLocalDpi xmlns:a14="http://schemas.microsoft.com/office/drawing/2010/main" val="0"/>
+              </a:ext>
+            </a:extLst>
+          </a:blip>
+          <a:srcRect t="26128"/>
+          <a:stretch>
+            <a:fillRect/>
+          </a:stretch>
+        </p:blipFill>
+        <p:spPr bwMode="auto">
+          <a:xfrm>
+            <a:off x="3914802" y="5016457"/>
+            <a:ext cx="2181198" cy="1089497"/>
+          </a:xfrm>
+          <a:prstGeom prst="rect">
+            <a:avLst/>
+          </a:prstGeom>
+          <a:noFill/>
+          <a:extLst>
+            <a:ext uri="{909E8E84-426E-40DD-AFC4-6F175D3DCCD1}">
+              <a14:hiddenFill xmlns:a14="http://schemas.microsoft.com/office/drawing/2010/main">
+                <a:solidFill>
+                  <a:srgbClr val="FFFFFF"/>
+                </a:solidFill>
+              </a14:hiddenFill>
+            </a:ext>
+          </a:extLst>
+        </p:spPr>
+      </p:pic>
+      <p:pic>
+        <p:nvPicPr>
+          <p:cNvPr id="13" name="Picture 6" descr="A Simplified, Yet Complex Solution (221B Baker Street) – Northern Dice">
+            <a:extLst>
+              <a:ext uri="{FF2B5EF4-FFF2-40B4-BE49-F238E27FC236}">
+                <a16:creationId xmlns:a16="http://schemas.microsoft.com/office/drawing/2014/main" id="{DA6E6ADD-1F31-501F-EA22-6A89DAD1FE34}"/>
+              </a:ext>
+            </a:extLst>
+          </p:cNvPr>
+          <p:cNvPicPr>
+            <a:picLocks noChangeAspect="1" noChangeArrowheads="1"/>
+          </p:cNvPicPr>
+          <p:nvPr/>
+        </p:nvPicPr>
+        <p:blipFill rotWithShape="1">
+          <a:blip r:embed="rId2">
+            <a:extLst>
+              <a:ext uri="{28A0092B-C50C-407E-A947-70E740481C1C}">
+                <a14:useLocalDpi xmlns:a14="http://schemas.microsoft.com/office/drawing/2010/main" val="0"/>
+              </a:ext>
+            </a:extLst>
+          </a:blip>
+          <a:srcRect t="26128"/>
+          <a:stretch>
+            <a:fillRect/>
+          </a:stretch>
+        </p:blipFill>
+        <p:spPr bwMode="auto">
+          <a:xfrm>
+            <a:off x="1747736" y="5016455"/>
+            <a:ext cx="2181198" cy="1089497"/>
+          </a:xfrm>
+          <a:prstGeom prst="rect">
+            <a:avLst/>
+          </a:prstGeom>
+          <a:noFill/>
+          <a:extLst>
+            <a:ext uri="{909E8E84-426E-40DD-AFC4-6F175D3DCCD1}">
+              <a14:hiddenFill xmlns:a14="http://schemas.microsoft.com/office/drawing/2010/main">
+                <a:solidFill>
+                  <a:srgbClr val="FFFFFF"/>
+                </a:solidFill>
+              </a14:hiddenFill>
+            </a:ext>
+          </a:extLst>
+        </p:spPr>
+      </p:pic>
+      <p:pic>
+        <p:nvPicPr>
+          <p:cNvPr id="14" name="Picture 6" descr="A Simplified, Yet Complex Solution (221B Baker Street) – Northern Dice">
+            <a:extLst>
+              <a:ext uri="{FF2B5EF4-FFF2-40B4-BE49-F238E27FC236}">
+                <a16:creationId xmlns:a16="http://schemas.microsoft.com/office/drawing/2014/main" id="{9C45F920-2491-C14C-5D54-02B06A8EDF84}"/>
+              </a:ext>
+            </a:extLst>
+          </p:cNvPr>
+          <p:cNvPicPr>
+            <a:picLocks noChangeAspect="1" noChangeArrowheads="1"/>
+          </p:cNvPicPr>
+          <p:nvPr/>
+        </p:nvPicPr>
+        <p:blipFill rotWithShape="1">
+          <a:blip r:embed="rId2">
+            <a:extLst>
+              <a:ext uri="{28A0092B-C50C-407E-A947-70E740481C1C}">
+                <a14:useLocalDpi xmlns:a14="http://schemas.microsoft.com/office/drawing/2010/main" val="0"/>
+              </a:ext>
+            </a:extLst>
+          </a:blip>
+          <a:srcRect t="26128"/>
+          <a:stretch>
+            <a:fillRect/>
+          </a:stretch>
+        </p:blipFill>
+        <p:spPr bwMode="auto">
+          <a:xfrm>
+            <a:off x="8248934" y="5016454"/>
+            <a:ext cx="2181198" cy="1089497"/>
+          </a:xfrm>
+          <a:prstGeom prst="rect">
+            <a:avLst/>
+          </a:prstGeom>
+          <a:noFill/>
+          <a:extLst>
+            <a:ext uri="{909E8E84-426E-40DD-AFC4-6F175D3DCCD1}">
+              <a14:hiddenFill xmlns:a14="http://schemas.microsoft.com/office/drawing/2010/main">
+                <a:solidFill>
+                  <a:srgbClr val="FFFFFF"/>
+                </a:solidFill>
+              </a14:hiddenFill>
+            </a:ext>
+          </a:extLst>
+        </p:spPr>
+      </p:pic>
+      <p:pic>
+        <p:nvPicPr>
+          <p:cNvPr id="15" name="Picture 6" descr="A Simplified, Yet Complex Solution (221B Baker Street) – Northern Dice">
+            <a:extLst>
+              <a:ext uri="{FF2B5EF4-FFF2-40B4-BE49-F238E27FC236}">
+                <a16:creationId xmlns:a16="http://schemas.microsoft.com/office/drawing/2014/main" id="{4EBB5A06-7759-0087-1E86-E6C1F0020BB0}"/>
+              </a:ext>
+            </a:extLst>
+          </p:cNvPr>
+          <p:cNvPicPr>
+            <a:picLocks noChangeAspect="1" noChangeArrowheads="1"/>
+          </p:cNvPicPr>
+          <p:nvPr/>
+        </p:nvPicPr>
+        <p:blipFill rotWithShape="1">
+          <a:blip r:embed="rId2">
+            <a:extLst>
+              <a:ext uri="{28A0092B-C50C-407E-A947-70E740481C1C}">
+                <a14:useLocalDpi xmlns:a14="http://schemas.microsoft.com/office/drawing/2010/main" val="0"/>
+              </a:ext>
+            </a:extLst>
+          </a:blip>
+          <a:srcRect t="26128"/>
+          <a:stretch>
+            <a:fillRect/>
+          </a:stretch>
+        </p:blipFill>
+        <p:spPr bwMode="auto">
+          <a:xfrm>
+            <a:off x="10401868" y="5016457"/>
+            <a:ext cx="2181198" cy="1089497"/>
+          </a:xfrm>
+          <a:prstGeom prst="rect">
+            <a:avLst/>
+          </a:prstGeom>
+          <a:noFill/>
+          <a:extLst>
+            <a:ext uri="{909E8E84-426E-40DD-AFC4-6F175D3DCCD1}">
+              <a14:hiddenFill xmlns:a14="http://schemas.microsoft.com/office/drawing/2010/main">
+                <a:solidFill>
+                  <a:srgbClr val="FFFFFF"/>
+                </a:solidFill>
+              </a14:hiddenFill>
+            </a:ext>
+          </a:extLst>
+        </p:spPr>
+      </p:pic>
+      <p:pic>
+        <p:nvPicPr>
+          <p:cNvPr id="16" name="Picture 6" descr="A Simplified, Yet Complex Solution (221B Baker Street) – Northern Dice">
+            <a:extLst>
+              <a:ext uri="{FF2B5EF4-FFF2-40B4-BE49-F238E27FC236}">
+                <a16:creationId xmlns:a16="http://schemas.microsoft.com/office/drawing/2014/main" id="{21CCD2F3-1BC8-BD28-C407-D432ED06BFCB}"/>
+              </a:ext>
+            </a:extLst>
+          </p:cNvPr>
+          <p:cNvPicPr>
+            <a:picLocks noChangeAspect="1" noChangeArrowheads="1"/>
+          </p:cNvPicPr>
+          <p:nvPr/>
+        </p:nvPicPr>
+        <p:blipFill rotWithShape="1">
+          <a:blip r:embed="rId2">
+            <a:extLst>
+              <a:ext uri="{28A0092B-C50C-407E-A947-70E740481C1C}">
+                <a14:useLocalDpi xmlns:a14="http://schemas.microsoft.com/office/drawing/2010/main" val="0"/>
+              </a:ext>
+            </a:extLst>
+          </a:blip>
+          <a:srcRect t="26128"/>
+          <a:stretch>
+            <a:fillRect/>
+          </a:stretch>
+        </p:blipFill>
+        <p:spPr bwMode="auto">
+          <a:xfrm>
+            <a:off x="-391065" y="3926952"/>
+            <a:ext cx="2181198" cy="1089497"/>
+          </a:xfrm>
+          <a:prstGeom prst="rect">
+            <a:avLst/>
+          </a:prstGeom>
+          <a:noFill/>
+          <a:extLst>
+            <a:ext uri="{909E8E84-426E-40DD-AFC4-6F175D3DCCD1}">
+              <a14:hiddenFill xmlns:a14="http://schemas.microsoft.com/office/drawing/2010/main">
+                <a:solidFill>
+                  <a:srgbClr val="FFFFFF"/>
+                </a:solidFill>
+              </a14:hiddenFill>
+            </a:ext>
+          </a:extLst>
+        </p:spPr>
+      </p:pic>
+      <p:pic>
+        <p:nvPicPr>
+          <p:cNvPr id="17" name="Picture 6" descr="A Simplified, Yet Complex Solution (221B Baker Street) – Northern Dice">
+            <a:extLst>
+              <a:ext uri="{FF2B5EF4-FFF2-40B4-BE49-F238E27FC236}">
+                <a16:creationId xmlns:a16="http://schemas.microsoft.com/office/drawing/2014/main" id="{00C38E31-16AB-0A94-B69D-636A21FFA50C}"/>
+              </a:ext>
+            </a:extLst>
+          </p:cNvPr>
+          <p:cNvPicPr>
+            <a:picLocks noChangeAspect="1" noChangeArrowheads="1"/>
+          </p:cNvPicPr>
+          <p:nvPr/>
+        </p:nvPicPr>
+        <p:blipFill rotWithShape="1">
+          <a:blip r:embed="rId2">
+            <a:extLst>
+              <a:ext uri="{28A0092B-C50C-407E-A947-70E740481C1C}">
+                <a14:useLocalDpi xmlns:a14="http://schemas.microsoft.com/office/drawing/2010/main" val="0"/>
+              </a:ext>
+            </a:extLst>
+          </a:blip>
+          <a:srcRect t="26128"/>
+          <a:stretch>
+            <a:fillRect/>
+          </a:stretch>
+        </p:blipFill>
+        <p:spPr bwMode="auto">
+          <a:xfrm>
+            <a:off x="6124265" y="3926952"/>
+            <a:ext cx="2181198" cy="1089497"/>
+          </a:xfrm>
+          <a:prstGeom prst="rect">
+            <a:avLst/>
+          </a:prstGeom>
+          <a:noFill/>
+          <a:extLst>
+            <a:ext uri="{909E8E84-426E-40DD-AFC4-6F175D3DCCD1}">
+              <a14:hiddenFill xmlns:a14="http://schemas.microsoft.com/office/drawing/2010/main">
+                <a:solidFill>
+                  <a:srgbClr val="FFFFFF"/>
+                </a:solidFill>
+              </a14:hiddenFill>
+            </a:ext>
+          </a:extLst>
+        </p:spPr>
+      </p:pic>
+      <p:pic>
+        <p:nvPicPr>
+          <p:cNvPr id="18" name="Picture 17" descr="A Simplified, Yet Complex Solution (221B Baker Street) – Northern Dice">
+            <a:extLst>
+              <a:ext uri="{FF2B5EF4-FFF2-40B4-BE49-F238E27FC236}">
+                <a16:creationId xmlns:a16="http://schemas.microsoft.com/office/drawing/2014/main" id="{B465E034-A146-FC4E-1543-C34801091609}"/>
+              </a:ext>
+            </a:extLst>
+          </p:cNvPr>
+          <p:cNvPicPr>
+            <a:picLocks noChangeAspect="1" noChangeArrowheads="1"/>
+          </p:cNvPicPr>
+          <p:nvPr/>
+        </p:nvPicPr>
+        <p:blipFill rotWithShape="1">
+          <a:blip r:embed="rId2">
+            <a:extLst>
+              <a:ext uri="{28A0092B-C50C-407E-A947-70E740481C1C}">
+                <a14:useLocalDpi xmlns:a14="http://schemas.microsoft.com/office/drawing/2010/main" val="0"/>
+              </a:ext>
+            </a:extLst>
+          </a:blip>
+          <a:srcRect t="26128"/>
+          <a:stretch>
+            <a:fillRect/>
+          </a:stretch>
+        </p:blipFill>
+        <p:spPr bwMode="auto">
+          <a:xfrm>
+            <a:off x="3943067" y="3926952"/>
+            <a:ext cx="2181198" cy="1089497"/>
+          </a:xfrm>
+          <a:prstGeom prst="rect">
+            <a:avLst/>
+          </a:prstGeom>
+          <a:noFill/>
+          <a:extLst>
+            <a:ext uri="{909E8E84-426E-40DD-AFC4-6F175D3DCCD1}">
+              <a14:hiddenFill xmlns:a14="http://schemas.microsoft.com/office/drawing/2010/main">
+                <a:solidFill>
+                  <a:srgbClr val="FFFFFF"/>
+                </a:solidFill>
+              </a14:hiddenFill>
+            </a:ext>
+          </a:extLst>
+        </p:spPr>
+      </p:pic>
+      <p:pic>
+        <p:nvPicPr>
+          <p:cNvPr id="19" name="Picture 6" descr="A Simplified, Yet Complex Solution (221B Baker Street) – Northern Dice">
+            <a:extLst>
+              <a:ext uri="{FF2B5EF4-FFF2-40B4-BE49-F238E27FC236}">
+                <a16:creationId xmlns:a16="http://schemas.microsoft.com/office/drawing/2014/main" id="{D8C83299-48F2-1C9F-C65B-E8A2768ACBA1}"/>
+              </a:ext>
+            </a:extLst>
+          </p:cNvPr>
+          <p:cNvPicPr>
+            <a:picLocks noChangeAspect="1" noChangeArrowheads="1"/>
+          </p:cNvPicPr>
+          <p:nvPr/>
+        </p:nvPicPr>
+        <p:blipFill rotWithShape="1">
+          <a:blip r:embed="rId2">
+            <a:extLst>
+              <a:ext uri="{28A0092B-C50C-407E-A947-70E740481C1C}">
+                <a14:useLocalDpi xmlns:a14="http://schemas.microsoft.com/office/drawing/2010/main" val="0"/>
+              </a:ext>
+            </a:extLst>
+          </a:blip>
+          <a:srcRect t="26128"/>
+          <a:stretch>
+            <a:fillRect/>
+          </a:stretch>
+        </p:blipFill>
+        <p:spPr bwMode="auto">
+          <a:xfrm>
+            <a:off x="1776001" y="3926950"/>
+            <a:ext cx="2181198" cy="1089497"/>
+          </a:xfrm>
+          <a:prstGeom prst="rect">
+            <a:avLst/>
+          </a:prstGeom>
+          <a:noFill/>
+          <a:extLst>
+            <a:ext uri="{909E8E84-426E-40DD-AFC4-6F175D3DCCD1}">
+              <a14:hiddenFill xmlns:a14="http://schemas.microsoft.com/office/drawing/2010/main">
+                <a:solidFill>
+                  <a:srgbClr val="FFFFFF"/>
+                </a:solidFill>
+              </a14:hiddenFill>
+            </a:ext>
+          </a:extLst>
+        </p:spPr>
+      </p:pic>
+      <p:pic>
+        <p:nvPicPr>
+          <p:cNvPr id="20" name="Picture 6" descr="A Simplified, Yet Complex Solution (221B Baker Street) – Northern Dice">
+            <a:extLst>
+              <a:ext uri="{FF2B5EF4-FFF2-40B4-BE49-F238E27FC236}">
+                <a16:creationId xmlns:a16="http://schemas.microsoft.com/office/drawing/2014/main" id="{EA34D482-D5D6-A6F6-610F-44D4877A69AA}"/>
+              </a:ext>
+            </a:extLst>
+          </p:cNvPr>
+          <p:cNvPicPr>
+            <a:picLocks noChangeAspect="1" noChangeArrowheads="1"/>
+          </p:cNvPicPr>
+          <p:nvPr/>
+        </p:nvPicPr>
+        <p:blipFill rotWithShape="1">
+          <a:blip r:embed="rId2">
+            <a:extLst>
+              <a:ext uri="{28A0092B-C50C-407E-A947-70E740481C1C}">
+                <a14:useLocalDpi xmlns:a14="http://schemas.microsoft.com/office/drawing/2010/main" val="0"/>
+              </a:ext>
+            </a:extLst>
+          </a:blip>
+          <a:srcRect t="26128"/>
+          <a:stretch>
+            <a:fillRect/>
+          </a:stretch>
+        </p:blipFill>
+        <p:spPr bwMode="auto">
+          <a:xfrm>
+            <a:off x="8277199" y="3926949"/>
+            <a:ext cx="2181198" cy="1089497"/>
+          </a:xfrm>
+          <a:prstGeom prst="rect">
+            <a:avLst/>
+          </a:prstGeom>
+          <a:noFill/>
+          <a:extLst>
+            <a:ext uri="{909E8E84-426E-40DD-AFC4-6F175D3DCCD1}">
+              <a14:hiddenFill xmlns:a14="http://schemas.microsoft.com/office/drawing/2010/main">
+                <a:solidFill>
+                  <a:srgbClr val="FFFFFF"/>
+                </a:solidFill>
+              </a14:hiddenFill>
+            </a:ext>
+          </a:extLst>
+        </p:spPr>
+      </p:pic>
+      <p:pic>
+        <p:nvPicPr>
+          <p:cNvPr id="21" name="Picture 6" descr="A Simplified, Yet Complex Solution (221B Baker Street) – Northern Dice">
+            <a:extLst>
+              <a:ext uri="{FF2B5EF4-FFF2-40B4-BE49-F238E27FC236}">
+                <a16:creationId xmlns:a16="http://schemas.microsoft.com/office/drawing/2014/main" id="{8AEB87EB-9BB5-00BA-489A-F9BDE59EA77B}"/>
+              </a:ext>
+            </a:extLst>
+          </p:cNvPr>
+          <p:cNvPicPr>
+            <a:picLocks noChangeAspect="1" noChangeArrowheads="1"/>
+          </p:cNvPicPr>
+          <p:nvPr/>
+        </p:nvPicPr>
+        <p:blipFill rotWithShape="1">
+          <a:blip r:embed="rId2">
+            <a:extLst>
+              <a:ext uri="{28A0092B-C50C-407E-A947-70E740481C1C}">
+                <a14:useLocalDpi xmlns:a14="http://schemas.microsoft.com/office/drawing/2010/main" val="0"/>
+              </a:ext>
+            </a:extLst>
+          </a:blip>
+          <a:srcRect t="26128"/>
+          <a:stretch>
+            <a:fillRect/>
+          </a:stretch>
+        </p:blipFill>
+        <p:spPr bwMode="auto">
+          <a:xfrm>
+            <a:off x="10430133" y="3926952"/>
+            <a:ext cx="2181198" cy="1089497"/>
+          </a:xfrm>
+          <a:prstGeom prst="rect">
+            <a:avLst/>
+          </a:prstGeom>
+          <a:noFill/>
+          <a:extLst>
+            <a:ext uri="{909E8E84-426E-40DD-AFC4-6F175D3DCCD1}">
+              <a14:hiddenFill xmlns:a14="http://schemas.microsoft.com/office/drawing/2010/main">
+                <a:solidFill>
+                  <a:srgbClr val="FFFFFF"/>
+                </a:solidFill>
+              </a14:hiddenFill>
+            </a:ext>
+          </a:extLst>
+        </p:spPr>
+      </p:pic>
+      <p:pic>
+        <p:nvPicPr>
+          <p:cNvPr id="22" name="Picture 6" descr="A Simplified, Yet Complex Solution (221B Baker Street) – Northern Dice">
+            <a:extLst>
+              <a:ext uri="{FF2B5EF4-FFF2-40B4-BE49-F238E27FC236}">
+                <a16:creationId xmlns:a16="http://schemas.microsoft.com/office/drawing/2014/main" id="{7BEEB4D8-EDE5-CD10-A2E4-C8A8007704F8}"/>
+              </a:ext>
+            </a:extLst>
+          </p:cNvPr>
+          <p:cNvPicPr>
+            <a:picLocks noChangeAspect="1" noChangeArrowheads="1"/>
+          </p:cNvPicPr>
+          <p:nvPr/>
+        </p:nvPicPr>
+        <p:blipFill rotWithShape="1">
+          <a:blip r:embed="rId2">
+            <a:extLst>
+              <a:ext uri="{28A0092B-C50C-407E-A947-70E740481C1C}">
+                <a14:useLocalDpi xmlns:a14="http://schemas.microsoft.com/office/drawing/2010/main" val="0"/>
+              </a:ext>
+            </a:extLst>
+          </a:blip>
+          <a:srcRect t="26128"/>
+          <a:stretch>
+            <a:fillRect/>
+          </a:stretch>
+        </p:blipFill>
+        <p:spPr bwMode="auto">
+          <a:xfrm>
+            <a:off x="-419330" y="2837438"/>
+            <a:ext cx="2181198" cy="1089497"/>
+          </a:xfrm>
+          <a:prstGeom prst="rect">
+            <a:avLst/>
+          </a:prstGeom>
+          <a:noFill/>
+          <a:extLst>
+            <a:ext uri="{909E8E84-426E-40DD-AFC4-6F175D3DCCD1}">
+              <a14:hiddenFill xmlns:a14="http://schemas.microsoft.com/office/drawing/2010/main">
+                <a:solidFill>
+                  <a:srgbClr val="FFFFFF"/>
+                </a:solidFill>
+              </a14:hiddenFill>
+            </a:ext>
+          </a:extLst>
+        </p:spPr>
+      </p:pic>
+      <p:pic>
+        <p:nvPicPr>
+          <p:cNvPr id="23" name="Picture 6" descr="A Simplified, Yet Complex Solution (221B Baker Street) – Northern Dice">
+            <a:extLst>
+              <a:ext uri="{FF2B5EF4-FFF2-40B4-BE49-F238E27FC236}">
+                <a16:creationId xmlns:a16="http://schemas.microsoft.com/office/drawing/2014/main" id="{1A78B6DE-1FCE-7EC7-C5EF-F024991E5879}"/>
+              </a:ext>
+            </a:extLst>
+          </p:cNvPr>
+          <p:cNvPicPr>
+            <a:picLocks noChangeAspect="1" noChangeArrowheads="1"/>
+          </p:cNvPicPr>
+          <p:nvPr/>
+        </p:nvPicPr>
+        <p:blipFill rotWithShape="1">
+          <a:blip r:embed="rId2">
+            <a:extLst>
+              <a:ext uri="{28A0092B-C50C-407E-A947-70E740481C1C}">
+                <a14:useLocalDpi xmlns:a14="http://schemas.microsoft.com/office/drawing/2010/main" val="0"/>
+              </a:ext>
+            </a:extLst>
+          </a:blip>
+          <a:srcRect t="26128"/>
+          <a:stretch>
+            <a:fillRect/>
+          </a:stretch>
+        </p:blipFill>
+        <p:spPr bwMode="auto">
+          <a:xfrm>
+            <a:off x="6096000" y="2837438"/>
+            <a:ext cx="2181198" cy="1089497"/>
+          </a:xfrm>
+          <a:prstGeom prst="rect">
+            <a:avLst/>
+          </a:prstGeom>
+          <a:noFill/>
+          <a:extLst>
+            <a:ext uri="{909E8E84-426E-40DD-AFC4-6F175D3DCCD1}">
+              <a14:hiddenFill xmlns:a14="http://schemas.microsoft.com/office/drawing/2010/main">
+                <a:solidFill>
+                  <a:srgbClr val="FFFFFF"/>
+                </a:solidFill>
+              </a14:hiddenFill>
+            </a:ext>
+          </a:extLst>
+        </p:spPr>
+      </p:pic>
+      <p:pic>
+        <p:nvPicPr>
+          <p:cNvPr id="24" name="Picture 23" descr="A Simplified, Yet Complex Solution (221B Baker Street) – Northern Dice">
+            <a:extLst>
+              <a:ext uri="{FF2B5EF4-FFF2-40B4-BE49-F238E27FC236}">
+                <a16:creationId xmlns:a16="http://schemas.microsoft.com/office/drawing/2014/main" id="{40AFF3E3-CE86-32C1-F940-43AA1A729487}"/>
+              </a:ext>
+            </a:extLst>
+          </p:cNvPr>
+          <p:cNvPicPr>
+            <a:picLocks noChangeAspect="1" noChangeArrowheads="1"/>
+          </p:cNvPicPr>
+          <p:nvPr/>
+        </p:nvPicPr>
+        <p:blipFill rotWithShape="1">
+          <a:blip r:embed="rId2">
+            <a:extLst>
+              <a:ext uri="{28A0092B-C50C-407E-A947-70E740481C1C}">
+                <a14:useLocalDpi xmlns:a14="http://schemas.microsoft.com/office/drawing/2010/main" val="0"/>
+              </a:ext>
+            </a:extLst>
+          </a:blip>
+          <a:srcRect t="26128"/>
+          <a:stretch>
+            <a:fillRect/>
+          </a:stretch>
+        </p:blipFill>
+        <p:spPr bwMode="auto">
+          <a:xfrm>
+            <a:off x="3914802" y="2837438"/>
+            <a:ext cx="2181198" cy="1089497"/>
+          </a:xfrm>
+          <a:prstGeom prst="rect">
+            <a:avLst/>
+          </a:prstGeom>
+          <a:noFill/>
+          <a:extLst>
+            <a:ext uri="{909E8E84-426E-40DD-AFC4-6F175D3DCCD1}">
+              <a14:hiddenFill xmlns:a14="http://schemas.microsoft.com/office/drawing/2010/main">
+                <a:solidFill>
+                  <a:srgbClr val="FFFFFF"/>
+                </a:solidFill>
+              </a14:hiddenFill>
+            </a:ext>
+          </a:extLst>
+        </p:spPr>
+      </p:pic>
+      <p:pic>
+        <p:nvPicPr>
+          <p:cNvPr id="25" name="Picture 6" descr="A Simplified, Yet Complex Solution (221B Baker Street) – Northern Dice">
+            <a:extLst>
+              <a:ext uri="{FF2B5EF4-FFF2-40B4-BE49-F238E27FC236}">
+                <a16:creationId xmlns:a16="http://schemas.microsoft.com/office/drawing/2014/main" id="{FEB6DE6E-1491-1DEA-FC2D-990F5204D87E}"/>
+              </a:ext>
+            </a:extLst>
+          </p:cNvPr>
+          <p:cNvPicPr>
+            <a:picLocks noChangeAspect="1" noChangeArrowheads="1"/>
+          </p:cNvPicPr>
+          <p:nvPr/>
+        </p:nvPicPr>
+        <p:blipFill rotWithShape="1">
+          <a:blip r:embed="rId2">
+            <a:extLst>
+              <a:ext uri="{28A0092B-C50C-407E-A947-70E740481C1C}">
+                <a14:useLocalDpi xmlns:a14="http://schemas.microsoft.com/office/drawing/2010/main" val="0"/>
+              </a:ext>
+            </a:extLst>
+          </a:blip>
+          <a:srcRect t="26128"/>
+          <a:stretch>
+            <a:fillRect/>
+          </a:stretch>
+        </p:blipFill>
+        <p:spPr bwMode="auto">
+          <a:xfrm>
+            <a:off x="1747736" y="2837436"/>
+            <a:ext cx="2181198" cy="1089497"/>
+          </a:xfrm>
+          <a:prstGeom prst="rect">
+            <a:avLst/>
+          </a:prstGeom>
+          <a:noFill/>
+          <a:extLst>
+            <a:ext uri="{909E8E84-426E-40DD-AFC4-6F175D3DCCD1}">
+              <a14:hiddenFill xmlns:a14="http://schemas.microsoft.com/office/drawing/2010/main">
+                <a:solidFill>
+                  <a:srgbClr val="FFFFFF"/>
+                </a:solidFill>
+              </a14:hiddenFill>
+            </a:ext>
+          </a:extLst>
+        </p:spPr>
+      </p:pic>
+      <p:pic>
+        <p:nvPicPr>
+          <p:cNvPr id="26" name="Picture 6" descr="A Simplified, Yet Complex Solution (221B Baker Street) – Northern Dice">
+            <a:extLst>
+              <a:ext uri="{FF2B5EF4-FFF2-40B4-BE49-F238E27FC236}">
+                <a16:creationId xmlns:a16="http://schemas.microsoft.com/office/drawing/2014/main" id="{AA679DDA-6CAD-71CB-A0CF-071835EB2003}"/>
+              </a:ext>
+            </a:extLst>
+          </p:cNvPr>
+          <p:cNvPicPr>
+            <a:picLocks noChangeAspect="1" noChangeArrowheads="1"/>
+          </p:cNvPicPr>
+          <p:nvPr/>
+        </p:nvPicPr>
+        <p:blipFill rotWithShape="1">
+          <a:blip r:embed="rId2">
+            <a:extLst>
+              <a:ext uri="{28A0092B-C50C-407E-A947-70E740481C1C}">
+                <a14:useLocalDpi xmlns:a14="http://schemas.microsoft.com/office/drawing/2010/main" val="0"/>
+              </a:ext>
+            </a:extLst>
+          </a:blip>
+          <a:srcRect t="26128"/>
+          <a:stretch>
+            <a:fillRect/>
+          </a:stretch>
+        </p:blipFill>
+        <p:spPr bwMode="auto">
+          <a:xfrm>
+            <a:off x="8248934" y="2837435"/>
+            <a:ext cx="2181198" cy="1089497"/>
+          </a:xfrm>
+          <a:prstGeom prst="rect">
+            <a:avLst/>
+          </a:prstGeom>
+          <a:noFill/>
+          <a:extLst>
+            <a:ext uri="{909E8E84-426E-40DD-AFC4-6F175D3DCCD1}">
+              <a14:hiddenFill xmlns:a14="http://schemas.microsoft.com/office/drawing/2010/main">
+                <a:solidFill>
+                  <a:srgbClr val="FFFFFF"/>
+                </a:solidFill>
+              </a14:hiddenFill>
+            </a:ext>
+          </a:extLst>
+        </p:spPr>
+      </p:pic>
+      <p:pic>
+        <p:nvPicPr>
+          <p:cNvPr id="27" name="Picture 6" descr="A Simplified, Yet Complex Solution (221B Baker Street) – Northern Dice">
+            <a:extLst>
+              <a:ext uri="{FF2B5EF4-FFF2-40B4-BE49-F238E27FC236}">
+                <a16:creationId xmlns:a16="http://schemas.microsoft.com/office/drawing/2014/main" id="{7CD704FC-40E6-F6FD-5340-80A94B2B30DB}"/>
+              </a:ext>
+            </a:extLst>
+          </p:cNvPr>
+          <p:cNvPicPr>
+            <a:picLocks noChangeAspect="1" noChangeArrowheads="1"/>
+          </p:cNvPicPr>
+          <p:nvPr/>
+        </p:nvPicPr>
+        <p:blipFill rotWithShape="1">
+          <a:blip r:embed="rId2">
+            <a:extLst>
+              <a:ext uri="{28A0092B-C50C-407E-A947-70E740481C1C}">
+                <a14:useLocalDpi xmlns:a14="http://schemas.microsoft.com/office/drawing/2010/main" val="0"/>
+              </a:ext>
+            </a:extLst>
+          </a:blip>
+          <a:srcRect t="26128"/>
+          <a:stretch>
+            <a:fillRect/>
+          </a:stretch>
+        </p:blipFill>
+        <p:spPr bwMode="auto">
+          <a:xfrm>
+            <a:off x="10401868" y="2837438"/>
+            <a:ext cx="2181198" cy="1089497"/>
+          </a:xfrm>
+          <a:prstGeom prst="rect">
+            <a:avLst/>
+          </a:prstGeom>
+          <a:noFill/>
+          <a:extLst>
+            <a:ext uri="{909E8E84-426E-40DD-AFC4-6F175D3DCCD1}">
+              <a14:hiddenFill xmlns:a14="http://schemas.microsoft.com/office/drawing/2010/main">
+                <a:solidFill>
+                  <a:srgbClr val="FFFFFF"/>
+                </a:solidFill>
+              </a14:hiddenFill>
+            </a:ext>
+          </a:extLst>
+        </p:spPr>
+      </p:pic>
+      <p:pic>
+        <p:nvPicPr>
+          <p:cNvPr id="28" name="Picture 6" descr="A Simplified, Yet Complex Solution (221B Baker Street) – Northern Dice">
+            <a:extLst>
+              <a:ext uri="{FF2B5EF4-FFF2-40B4-BE49-F238E27FC236}">
+                <a16:creationId xmlns:a16="http://schemas.microsoft.com/office/drawing/2014/main" id="{F4FD205D-3C8F-5705-F123-09D19B509C15}"/>
+              </a:ext>
+            </a:extLst>
+          </p:cNvPr>
+          <p:cNvPicPr>
+            <a:picLocks noChangeAspect="1" noChangeArrowheads="1"/>
+          </p:cNvPicPr>
+          <p:nvPr/>
+        </p:nvPicPr>
+        <p:blipFill rotWithShape="1">
+          <a:blip r:embed="rId2">
+            <a:extLst>
+              <a:ext uri="{28A0092B-C50C-407E-A947-70E740481C1C}">
+                <a14:useLocalDpi xmlns:a14="http://schemas.microsoft.com/office/drawing/2010/main" val="0"/>
+              </a:ext>
+            </a:extLst>
+          </a:blip>
+          <a:srcRect t="26128"/>
+          <a:stretch>
+            <a:fillRect/>
+          </a:stretch>
+        </p:blipFill>
+        <p:spPr bwMode="auto">
+          <a:xfrm>
+            <a:off x="-419330" y="1747913"/>
+            <a:ext cx="2181198" cy="1089497"/>
+          </a:xfrm>
+          <a:prstGeom prst="rect">
+            <a:avLst/>
+          </a:prstGeom>
+          <a:noFill/>
+          <a:extLst>
+            <a:ext uri="{909E8E84-426E-40DD-AFC4-6F175D3DCCD1}">
+              <a14:hiddenFill xmlns:a14="http://schemas.microsoft.com/office/drawing/2010/main">
+                <a:solidFill>
+                  <a:srgbClr val="FFFFFF"/>
+                </a:solidFill>
+              </a14:hiddenFill>
+            </a:ext>
+          </a:extLst>
+        </p:spPr>
+      </p:pic>
+      <p:pic>
+        <p:nvPicPr>
+          <p:cNvPr id="29" name="Picture 6" descr="A Simplified, Yet Complex Solution (221B Baker Street) – Northern Dice">
+            <a:extLst>
+              <a:ext uri="{FF2B5EF4-FFF2-40B4-BE49-F238E27FC236}">
+                <a16:creationId xmlns:a16="http://schemas.microsoft.com/office/drawing/2014/main" id="{922083EA-5EE0-EF19-8EBA-971C96ACBBD7}"/>
+              </a:ext>
+            </a:extLst>
+          </p:cNvPr>
+          <p:cNvPicPr>
+            <a:picLocks noChangeAspect="1" noChangeArrowheads="1"/>
+          </p:cNvPicPr>
+          <p:nvPr/>
+        </p:nvPicPr>
+        <p:blipFill rotWithShape="1">
+          <a:blip r:embed="rId2">
+            <a:extLst>
+              <a:ext uri="{28A0092B-C50C-407E-A947-70E740481C1C}">
+                <a14:useLocalDpi xmlns:a14="http://schemas.microsoft.com/office/drawing/2010/main" val="0"/>
+              </a:ext>
+            </a:extLst>
+          </a:blip>
+          <a:srcRect t="26128"/>
+          <a:stretch>
+            <a:fillRect/>
+          </a:stretch>
+        </p:blipFill>
+        <p:spPr bwMode="auto">
+          <a:xfrm>
+            <a:off x="6096000" y="1747913"/>
+            <a:ext cx="2181198" cy="1089497"/>
+          </a:xfrm>
+          <a:prstGeom prst="rect">
+            <a:avLst/>
+          </a:prstGeom>
+          <a:noFill/>
+          <a:extLst>
+            <a:ext uri="{909E8E84-426E-40DD-AFC4-6F175D3DCCD1}">
+              <a14:hiddenFill xmlns:a14="http://schemas.microsoft.com/office/drawing/2010/main">
+                <a:solidFill>
+                  <a:srgbClr val="FFFFFF"/>
+                </a:solidFill>
+              </a14:hiddenFill>
+            </a:ext>
+          </a:extLst>
+        </p:spPr>
+      </p:pic>
+      <p:pic>
+        <p:nvPicPr>
+          <p:cNvPr id="30" name="Picture 29" descr="A Simplified, Yet Complex Solution (221B Baker Street) – Northern Dice">
+            <a:extLst>
+              <a:ext uri="{FF2B5EF4-FFF2-40B4-BE49-F238E27FC236}">
+                <a16:creationId xmlns:a16="http://schemas.microsoft.com/office/drawing/2014/main" id="{04AB8317-EC50-A2B0-0F87-518D3EA3DF7F}"/>
+              </a:ext>
+            </a:extLst>
+          </p:cNvPr>
+          <p:cNvPicPr>
+            <a:picLocks noChangeAspect="1" noChangeArrowheads="1"/>
+          </p:cNvPicPr>
+          <p:nvPr/>
+        </p:nvPicPr>
+        <p:blipFill rotWithShape="1">
+          <a:blip r:embed="rId2">
+            <a:extLst>
+              <a:ext uri="{28A0092B-C50C-407E-A947-70E740481C1C}">
+                <a14:useLocalDpi xmlns:a14="http://schemas.microsoft.com/office/drawing/2010/main" val="0"/>
+              </a:ext>
+            </a:extLst>
+          </a:blip>
+          <a:srcRect t="26128"/>
+          <a:stretch>
+            <a:fillRect/>
+          </a:stretch>
+        </p:blipFill>
+        <p:spPr bwMode="auto">
+          <a:xfrm>
+            <a:off x="3914802" y="1747913"/>
+            <a:ext cx="2181198" cy="1089497"/>
+          </a:xfrm>
+          <a:prstGeom prst="rect">
+            <a:avLst/>
+          </a:prstGeom>
+          <a:noFill/>
+          <a:extLst>
+            <a:ext uri="{909E8E84-426E-40DD-AFC4-6F175D3DCCD1}">
+              <a14:hiddenFill xmlns:a14="http://schemas.microsoft.com/office/drawing/2010/main">
+                <a:solidFill>
+                  <a:srgbClr val="FFFFFF"/>
+                </a:solidFill>
+              </a14:hiddenFill>
+            </a:ext>
+          </a:extLst>
+        </p:spPr>
+      </p:pic>
+      <p:pic>
+        <p:nvPicPr>
+          <p:cNvPr id="31" name="Picture 6" descr="A Simplified, Yet Complex Solution (221B Baker Street) – Northern Dice">
+            <a:extLst>
+              <a:ext uri="{FF2B5EF4-FFF2-40B4-BE49-F238E27FC236}">
+                <a16:creationId xmlns:a16="http://schemas.microsoft.com/office/drawing/2014/main" id="{9DB8ECE2-6C1D-65BB-9870-467721919752}"/>
+              </a:ext>
+            </a:extLst>
+          </p:cNvPr>
+          <p:cNvPicPr>
+            <a:picLocks noChangeAspect="1" noChangeArrowheads="1"/>
+          </p:cNvPicPr>
+          <p:nvPr/>
+        </p:nvPicPr>
+        <p:blipFill rotWithShape="1">
+          <a:blip r:embed="rId2">
+            <a:extLst>
+              <a:ext uri="{28A0092B-C50C-407E-A947-70E740481C1C}">
+                <a14:useLocalDpi xmlns:a14="http://schemas.microsoft.com/office/drawing/2010/main" val="0"/>
+              </a:ext>
+            </a:extLst>
+          </a:blip>
+          <a:srcRect t="26128"/>
+          <a:stretch>
+            <a:fillRect/>
+          </a:stretch>
+        </p:blipFill>
+        <p:spPr bwMode="auto">
+          <a:xfrm>
+            <a:off x="1747736" y="1747911"/>
+            <a:ext cx="2181198" cy="1089497"/>
+          </a:xfrm>
+          <a:prstGeom prst="rect">
+            <a:avLst/>
+          </a:prstGeom>
+          <a:noFill/>
+          <a:extLst>
+            <a:ext uri="{909E8E84-426E-40DD-AFC4-6F175D3DCCD1}">
+              <a14:hiddenFill xmlns:a14="http://schemas.microsoft.com/office/drawing/2010/main">
+                <a:solidFill>
+                  <a:srgbClr val="FFFFFF"/>
+                </a:solidFill>
+              </a14:hiddenFill>
+            </a:ext>
+          </a:extLst>
+        </p:spPr>
+      </p:pic>
+      <p:pic>
+        <p:nvPicPr>
+          <p:cNvPr id="32" name="Picture 6" descr="A Simplified, Yet Complex Solution (221B Baker Street) – Northern Dice">
+            <a:extLst>
+              <a:ext uri="{FF2B5EF4-FFF2-40B4-BE49-F238E27FC236}">
+                <a16:creationId xmlns:a16="http://schemas.microsoft.com/office/drawing/2014/main" id="{E4477AFA-370A-F07B-12EB-4747D007258D}"/>
+              </a:ext>
+            </a:extLst>
+          </p:cNvPr>
+          <p:cNvPicPr>
+            <a:picLocks noChangeAspect="1" noChangeArrowheads="1"/>
+          </p:cNvPicPr>
+          <p:nvPr/>
+        </p:nvPicPr>
+        <p:blipFill rotWithShape="1">
+          <a:blip r:embed="rId2">
+            <a:extLst>
+              <a:ext uri="{28A0092B-C50C-407E-A947-70E740481C1C}">
+                <a14:useLocalDpi xmlns:a14="http://schemas.microsoft.com/office/drawing/2010/main" val="0"/>
+              </a:ext>
+            </a:extLst>
+          </a:blip>
+          <a:srcRect t="26128"/>
+          <a:stretch>
+            <a:fillRect/>
+          </a:stretch>
+        </p:blipFill>
+        <p:spPr bwMode="auto">
+          <a:xfrm>
+            <a:off x="8248934" y="1747910"/>
+            <a:ext cx="2181198" cy="1089497"/>
+          </a:xfrm>
+          <a:prstGeom prst="rect">
+            <a:avLst/>
+          </a:prstGeom>
+          <a:noFill/>
+          <a:extLst>
+            <a:ext uri="{909E8E84-426E-40DD-AFC4-6F175D3DCCD1}">
+              <a14:hiddenFill xmlns:a14="http://schemas.microsoft.com/office/drawing/2010/main">
+                <a:solidFill>
+                  <a:srgbClr val="FFFFFF"/>
+                </a:solidFill>
+              </a14:hiddenFill>
+            </a:ext>
+          </a:extLst>
+        </p:spPr>
+      </p:pic>
+      <p:pic>
+        <p:nvPicPr>
+          <p:cNvPr id="33" name="Picture 6" descr="A Simplified, Yet Complex Solution (221B Baker Street) – Northern Dice">
+            <a:extLst>
+              <a:ext uri="{FF2B5EF4-FFF2-40B4-BE49-F238E27FC236}">
+                <a16:creationId xmlns:a16="http://schemas.microsoft.com/office/drawing/2014/main" id="{C66FB535-BAD0-9F67-08D8-222B10F8B35C}"/>
+              </a:ext>
+            </a:extLst>
+          </p:cNvPr>
+          <p:cNvPicPr>
+            <a:picLocks noChangeAspect="1" noChangeArrowheads="1"/>
+          </p:cNvPicPr>
+          <p:nvPr/>
+        </p:nvPicPr>
+        <p:blipFill rotWithShape="1">
+          <a:blip r:embed="rId2">
+            <a:extLst>
+              <a:ext uri="{28A0092B-C50C-407E-A947-70E740481C1C}">
+                <a14:useLocalDpi xmlns:a14="http://schemas.microsoft.com/office/drawing/2010/main" val="0"/>
+              </a:ext>
+            </a:extLst>
+          </a:blip>
+          <a:srcRect t="26128"/>
+          <a:stretch>
+            <a:fillRect/>
+          </a:stretch>
+        </p:blipFill>
+        <p:spPr bwMode="auto">
+          <a:xfrm>
+            <a:off x="10401868" y="1747913"/>
+            <a:ext cx="2181198" cy="1089497"/>
+          </a:xfrm>
+          <a:prstGeom prst="rect">
+            <a:avLst/>
+          </a:prstGeom>
+          <a:noFill/>
+          <a:extLst>
+            <a:ext uri="{909E8E84-426E-40DD-AFC4-6F175D3DCCD1}">
+              <a14:hiddenFill xmlns:a14="http://schemas.microsoft.com/office/drawing/2010/main">
+                <a:solidFill>
+                  <a:srgbClr val="FFFFFF"/>
+                </a:solidFill>
+              </a14:hiddenFill>
+            </a:ext>
+          </a:extLst>
+        </p:spPr>
+      </p:pic>
+      <p:pic>
+        <p:nvPicPr>
+          <p:cNvPr id="34" name="Picture 6" descr="A Simplified, Yet Complex Solution (221B Baker Street) – Northern Dice">
+            <a:extLst>
+              <a:ext uri="{FF2B5EF4-FFF2-40B4-BE49-F238E27FC236}">
+                <a16:creationId xmlns:a16="http://schemas.microsoft.com/office/drawing/2014/main" id="{B3FF2C75-B72D-BE28-69BD-919D85623EF2}"/>
+              </a:ext>
+            </a:extLst>
+          </p:cNvPr>
+          <p:cNvPicPr>
+            <a:picLocks noChangeAspect="1" noChangeArrowheads="1"/>
+          </p:cNvPicPr>
+          <p:nvPr/>
+        </p:nvPicPr>
+        <p:blipFill rotWithShape="1">
+          <a:blip r:embed="rId2">
+            <a:extLst>
+              <a:ext uri="{28A0092B-C50C-407E-A947-70E740481C1C}">
+                <a14:useLocalDpi xmlns:a14="http://schemas.microsoft.com/office/drawing/2010/main" val="0"/>
+              </a:ext>
+            </a:extLst>
+          </a:blip>
+          <a:srcRect t="26128"/>
+          <a:stretch>
+            <a:fillRect/>
+          </a:stretch>
+        </p:blipFill>
+        <p:spPr bwMode="auto">
+          <a:xfrm>
+            <a:off x="-419330" y="658385"/>
+            <a:ext cx="2181198" cy="1089497"/>
+          </a:xfrm>
+          <a:prstGeom prst="rect">
+            <a:avLst/>
+          </a:prstGeom>
+          <a:noFill/>
+          <a:extLst>
+            <a:ext uri="{909E8E84-426E-40DD-AFC4-6F175D3DCCD1}">
+              <a14:hiddenFill xmlns:a14="http://schemas.microsoft.com/office/drawing/2010/main">
+                <a:solidFill>
+                  <a:srgbClr val="FFFFFF"/>
+                </a:solidFill>
+              </a14:hiddenFill>
+            </a:ext>
+          </a:extLst>
+        </p:spPr>
+      </p:pic>
+      <p:pic>
+        <p:nvPicPr>
+          <p:cNvPr id="35" name="Picture 6" descr="A Simplified, Yet Complex Solution (221B Baker Street) – Northern Dice">
+            <a:extLst>
+              <a:ext uri="{FF2B5EF4-FFF2-40B4-BE49-F238E27FC236}">
+                <a16:creationId xmlns:a16="http://schemas.microsoft.com/office/drawing/2014/main" id="{B3702C58-EAE5-A088-F6F0-5D119EE1BA3F}"/>
+              </a:ext>
+            </a:extLst>
+          </p:cNvPr>
+          <p:cNvPicPr>
+            <a:picLocks noChangeAspect="1" noChangeArrowheads="1"/>
+          </p:cNvPicPr>
+          <p:nvPr/>
+        </p:nvPicPr>
+        <p:blipFill rotWithShape="1">
+          <a:blip r:embed="rId2">
+            <a:extLst>
+              <a:ext uri="{28A0092B-C50C-407E-A947-70E740481C1C}">
+                <a14:useLocalDpi xmlns:a14="http://schemas.microsoft.com/office/drawing/2010/main" val="0"/>
+              </a:ext>
+            </a:extLst>
+          </a:blip>
+          <a:srcRect t="26128"/>
+          <a:stretch>
+            <a:fillRect/>
+          </a:stretch>
+        </p:blipFill>
+        <p:spPr bwMode="auto">
+          <a:xfrm>
+            <a:off x="6096000" y="658385"/>
+            <a:ext cx="2181198" cy="1089497"/>
+          </a:xfrm>
+          <a:prstGeom prst="rect">
+            <a:avLst/>
+          </a:prstGeom>
+          <a:noFill/>
+          <a:extLst>
+            <a:ext uri="{909E8E84-426E-40DD-AFC4-6F175D3DCCD1}">
+              <a14:hiddenFill xmlns:a14="http://schemas.microsoft.com/office/drawing/2010/main">
+                <a:solidFill>
+                  <a:srgbClr val="FFFFFF"/>
+                </a:solidFill>
+              </a14:hiddenFill>
+            </a:ext>
+          </a:extLst>
+        </p:spPr>
+      </p:pic>
+      <p:pic>
+        <p:nvPicPr>
+          <p:cNvPr id="36" name="Picture 35" descr="A Simplified, Yet Complex Solution (221B Baker Street) – Northern Dice">
+            <a:extLst>
+              <a:ext uri="{FF2B5EF4-FFF2-40B4-BE49-F238E27FC236}">
+                <a16:creationId xmlns:a16="http://schemas.microsoft.com/office/drawing/2014/main" id="{2E5C1FF5-5286-5927-5780-B977B1F45548}"/>
+              </a:ext>
+            </a:extLst>
+          </p:cNvPr>
+          <p:cNvPicPr>
+            <a:picLocks noChangeAspect="1" noChangeArrowheads="1"/>
+          </p:cNvPicPr>
+          <p:nvPr/>
+        </p:nvPicPr>
+        <p:blipFill rotWithShape="1">
+          <a:blip r:embed="rId2">
+            <a:extLst>
+              <a:ext uri="{28A0092B-C50C-407E-A947-70E740481C1C}">
+                <a14:useLocalDpi xmlns:a14="http://schemas.microsoft.com/office/drawing/2010/main" val="0"/>
+              </a:ext>
+            </a:extLst>
+          </a:blip>
+          <a:srcRect t="26128"/>
+          <a:stretch>
+            <a:fillRect/>
+          </a:stretch>
+        </p:blipFill>
+        <p:spPr bwMode="auto">
+          <a:xfrm>
+            <a:off x="3914802" y="658385"/>
+            <a:ext cx="2181198" cy="1089497"/>
+          </a:xfrm>
+          <a:prstGeom prst="rect">
+            <a:avLst/>
+          </a:prstGeom>
+          <a:noFill/>
+          <a:extLst>
+            <a:ext uri="{909E8E84-426E-40DD-AFC4-6F175D3DCCD1}">
+              <a14:hiddenFill xmlns:a14="http://schemas.microsoft.com/office/drawing/2010/main">
+                <a:solidFill>
+                  <a:srgbClr val="FFFFFF"/>
+                </a:solidFill>
+              </a14:hiddenFill>
+            </a:ext>
+          </a:extLst>
+        </p:spPr>
+      </p:pic>
+      <p:pic>
+        <p:nvPicPr>
+          <p:cNvPr id="37" name="Picture 6" descr="A Simplified, Yet Complex Solution (221B Baker Street) – Northern Dice">
+            <a:extLst>
+              <a:ext uri="{FF2B5EF4-FFF2-40B4-BE49-F238E27FC236}">
+                <a16:creationId xmlns:a16="http://schemas.microsoft.com/office/drawing/2014/main" id="{259897B4-6360-DADD-D4D4-BF54D63E660E}"/>
+              </a:ext>
+            </a:extLst>
+          </p:cNvPr>
+          <p:cNvPicPr>
+            <a:picLocks noChangeAspect="1" noChangeArrowheads="1"/>
+          </p:cNvPicPr>
+          <p:nvPr/>
+        </p:nvPicPr>
+        <p:blipFill rotWithShape="1">
+          <a:blip r:embed="rId2">
+            <a:extLst>
+              <a:ext uri="{28A0092B-C50C-407E-A947-70E740481C1C}">
+                <a14:useLocalDpi xmlns:a14="http://schemas.microsoft.com/office/drawing/2010/main" val="0"/>
+              </a:ext>
+            </a:extLst>
+          </a:blip>
+          <a:srcRect t="26128"/>
+          <a:stretch>
+            <a:fillRect/>
+          </a:stretch>
+        </p:blipFill>
+        <p:spPr bwMode="auto">
+          <a:xfrm>
+            <a:off x="1747736" y="658383"/>
+            <a:ext cx="2181198" cy="1089497"/>
+          </a:xfrm>
+          <a:prstGeom prst="rect">
+            <a:avLst/>
+          </a:prstGeom>
+          <a:noFill/>
+          <a:extLst>
+            <a:ext uri="{909E8E84-426E-40DD-AFC4-6F175D3DCCD1}">
+              <a14:hiddenFill xmlns:a14="http://schemas.microsoft.com/office/drawing/2010/main">
+                <a:solidFill>
+                  <a:srgbClr val="FFFFFF"/>
+                </a:solidFill>
+              </a14:hiddenFill>
+            </a:ext>
+          </a:extLst>
+        </p:spPr>
+      </p:pic>
+      <p:pic>
+        <p:nvPicPr>
+          <p:cNvPr id="38" name="Picture 6" descr="A Simplified, Yet Complex Solution (221B Baker Street) – Northern Dice">
+            <a:extLst>
+              <a:ext uri="{FF2B5EF4-FFF2-40B4-BE49-F238E27FC236}">
+                <a16:creationId xmlns:a16="http://schemas.microsoft.com/office/drawing/2014/main" id="{1B3265C6-43DD-4100-408D-ED2AC2A46E28}"/>
+              </a:ext>
+            </a:extLst>
+          </p:cNvPr>
+          <p:cNvPicPr>
+            <a:picLocks noChangeAspect="1" noChangeArrowheads="1"/>
+          </p:cNvPicPr>
+          <p:nvPr/>
+        </p:nvPicPr>
+        <p:blipFill rotWithShape="1">
+          <a:blip r:embed="rId2">
+            <a:extLst>
+              <a:ext uri="{28A0092B-C50C-407E-A947-70E740481C1C}">
+                <a14:useLocalDpi xmlns:a14="http://schemas.microsoft.com/office/drawing/2010/main" val="0"/>
+              </a:ext>
+            </a:extLst>
+          </a:blip>
+          <a:srcRect t="26128"/>
+          <a:stretch>
+            <a:fillRect/>
+          </a:stretch>
+        </p:blipFill>
+        <p:spPr bwMode="auto">
+          <a:xfrm>
+            <a:off x="8248934" y="658382"/>
+            <a:ext cx="2181198" cy="1089497"/>
+          </a:xfrm>
+          <a:prstGeom prst="rect">
+            <a:avLst/>
+          </a:prstGeom>
+          <a:noFill/>
+          <a:extLst>
+            <a:ext uri="{909E8E84-426E-40DD-AFC4-6F175D3DCCD1}">
+              <a14:hiddenFill xmlns:a14="http://schemas.microsoft.com/office/drawing/2010/main">
+                <a:solidFill>
+                  <a:srgbClr val="FFFFFF"/>
+                </a:solidFill>
+              </a14:hiddenFill>
+            </a:ext>
+          </a:extLst>
+        </p:spPr>
+      </p:pic>
+      <p:pic>
+        <p:nvPicPr>
+          <p:cNvPr id="39" name="Picture 6" descr="A Simplified, Yet Complex Solution (221B Baker Street) – Northern Dice">
+            <a:extLst>
+              <a:ext uri="{FF2B5EF4-FFF2-40B4-BE49-F238E27FC236}">
+                <a16:creationId xmlns:a16="http://schemas.microsoft.com/office/drawing/2014/main" id="{B9E8722E-EFFE-0072-2409-56F2578A6987}"/>
+              </a:ext>
+            </a:extLst>
+          </p:cNvPr>
+          <p:cNvPicPr>
+            <a:picLocks noChangeAspect="1" noChangeArrowheads="1"/>
+          </p:cNvPicPr>
+          <p:nvPr/>
+        </p:nvPicPr>
+        <p:blipFill rotWithShape="1">
+          <a:blip r:embed="rId2">
+            <a:extLst>
+              <a:ext uri="{28A0092B-C50C-407E-A947-70E740481C1C}">
+                <a14:useLocalDpi xmlns:a14="http://schemas.microsoft.com/office/drawing/2010/main" val="0"/>
+              </a:ext>
+            </a:extLst>
+          </a:blip>
+          <a:srcRect t="26128"/>
+          <a:stretch>
+            <a:fillRect/>
+          </a:stretch>
+        </p:blipFill>
+        <p:spPr bwMode="auto">
+          <a:xfrm>
+            <a:off x="10401868" y="658385"/>
+            <a:ext cx="2181198" cy="1089497"/>
+          </a:xfrm>
+          <a:prstGeom prst="rect">
+            <a:avLst/>
+          </a:prstGeom>
+          <a:noFill/>
+          <a:extLst>
+            <a:ext uri="{909E8E84-426E-40DD-AFC4-6F175D3DCCD1}">
+              <a14:hiddenFill xmlns:a14="http://schemas.microsoft.com/office/drawing/2010/main">
+                <a:solidFill>
+                  <a:srgbClr val="FFFFFF"/>
+                </a:solidFill>
+              </a14:hiddenFill>
+            </a:ext>
+          </a:extLst>
+        </p:spPr>
+      </p:pic>
+      <p:pic>
+        <p:nvPicPr>
+          <p:cNvPr id="40" name="Picture 6" descr="A Simplified, Yet Complex Solution (221B Baker Street) – Northern Dice">
+            <a:extLst>
+              <a:ext uri="{FF2B5EF4-FFF2-40B4-BE49-F238E27FC236}">
+                <a16:creationId xmlns:a16="http://schemas.microsoft.com/office/drawing/2014/main" id="{31CD2BA1-F31B-0F61-06D9-9ACA604C970F}"/>
+              </a:ext>
+            </a:extLst>
+          </p:cNvPr>
+          <p:cNvPicPr>
+            <a:picLocks noChangeAspect="1" noChangeArrowheads="1"/>
+          </p:cNvPicPr>
+          <p:nvPr/>
+        </p:nvPicPr>
+        <p:blipFill rotWithShape="1">
+          <a:blip r:embed="rId2">
+            <a:extLst>
+              <a:ext uri="{28A0092B-C50C-407E-A947-70E740481C1C}">
+                <a14:useLocalDpi xmlns:a14="http://schemas.microsoft.com/office/drawing/2010/main" val="0"/>
+              </a:ext>
+            </a:extLst>
+          </a:blip>
+          <a:srcRect t="26128"/>
+          <a:stretch>
+            <a:fillRect/>
+          </a:stretch>
+        </p:blipFill>
+        <p:spPr bwMode="auto">
+          <a:xfrm>
+            <a:off x="-419330" y="-431146"/>
+            <a:ext cx="2181198" cy="1089497"/>
+          </a:xfrm>
+          <a:prstGeom prst="rect">
+            <a:avLst/>
+          </a:prstGeom>
+          <a:noFill/>
+          <a:extLst>
+            <a:ext uri="{909E8E84-426E-40DD-AFC4-6F175D3DCCD1}">
+              <a14:hiddenFill xmlns:a14="http://schemas.microsoft.com/office/drawing/2010/main">
+                <a:solidFill>
+                  <a:srgbClr val="FFFFFF"/>
+                </a:solidFill>
+              </a14:hiddenFill>
+            </a:ext>
+          </a:extLst>
+        </p:spPr>
+      </p:pic>
+      <p:pic>
+        <p:nvPicPr>
+          <p:cNvPr id="41" name="Picture 6" descr="A Simplified, Yet Complex Solution (221B Baker Street) – Northern Dice">
+            <a:extLst>
+              <a:ext uri="{FF2B5EF4-FFF2-40B4-BE49-F238E27FC236}">
+                <a16:creationId xmlns:a16="http://schemas.microsoft.com/office/drawing/2014/main" id="{6EC238DB-E82C-7B45-051E-4204F2569F8D}"/>
+              </a:ext>
+            </a:extLst>
+          </p:cNvPr>
+          <p:cNvPicPr>
+            <a:picLocks noChangeAspect="1" noChangeArrowheads="1"/>
+          </p:cNvPicPr>
+          <p:nvPr/>
+        </p:nvPicPr>
+        <p:blipFill rotWithShape="1">
+          <a:blip r:embed="rId2">
+            <a:extLst>
+              <a:ext uri="{28A0092B-C50C-407E-A947-70E740481C1C}">
+                <a14:useLocalDpi xmlns:a14="http://schemas.microsoft.com/office/drawing/2010/main" val="0"/>
+              </a:ext>
+            </a:extLst>
+          </a:blip>
+          <a:srcRect t="26128"/>
+          <a:stretch>
+            <a:fillRect/>
+          </a:stretch>
+        </p:blipFill>
+        <p:spPr bwMode="auto">
+          <a:xfrm>
+            <a:off x="6096000" y="-431146"/>
+            <a:ext cx="2181198" cy="1089497"/>
+          </a:xfrm>
+          <a:prstGeom prst="rect">
+            <a:avLst/>
+          </a:prstGeom>
+          <a:noFill/>
+          <a:extLst>
+            <a:ext uri="{909E8E84-426E-40DD-AFC4-6F175D3DCCD1}">
+              <a14:hiddenFill xmlns:a14="http://schemas.microsoft.com/office/drawing/2010/main">
+                <a:solidFill>
+                  <a:srgbClr val="FFFFFF"/>
+                </a:solidFill>
+              </a14:hiddenFill>
+            </a:ext>
+          </a:extLst>
+        </p:spPr>
+      </p:pic>
+      <p:pic>
+        <p:nvPicPr>
+          <p:cNvPr id="42" name="Picture 41" descr="A Simplified, Yet Complex Solution (221B Baker Street) – Northern Dice">
+            <a:extLst>
+              <a:ext uri="{FF2B5EF4-FFF2-40B4-BE49-F238E27FC236}">
+                <a16:creationId xmlns:a16="http://schemas.microsoft.com/office/drawing/2014/main" id="{F1AFA5FF-CE79-BA77-7C16-D55619A2711F}"/>
+              </a:ext>
+            </a:extLst>
+          </p:cNvPr>
+          <p:cNvPicPr>
+            <a:picLocks noChangeAspect="1" noChangeArrowheads="1"/>
+          </p:cNvPicPr>
+          <p:nvPr/>
+        </p:nvPicPr>
+        <p:blipFill rotWithShape="1">
+          <a:blip r:embed="rId2">
+            <a:extLst>
+              <a:ext uri="{28A0092B-C50C-407E-A947-70E740481C1C}">
+                <a14:useLocalDpi xmlns:a14="http://schemas.microsoft.com/office/drawing/2010/main" val="0"/>
+              </a:ext>
+            </a:extLst>
+          </a:blip>
+          <a:srcRect t="26128"/>
+          <a:stretch>
+            <a:fillRect/>
+          </a:stretch>
+        </p:blipFill>
+        <p:spPr bwMode="auto">
+          <a:xfrm>
+            <a:off x="3914802" y="-431146"/>
+            <a:ext cx="2181198" cy="1089497"/>
+          </a:xfrm>
+          <a:prstGeom prst="rect">
+            <a:avLst/>
+          </a:prstGeom>
+          <a:noFill/>
+          <a:extLst>
+            <a:ext uri="{909E8E84-426E-40DD-AFC4-6F175D3DCCD1}">
+              <a14:hiddenFill xmlns:a14="http://schemas.microsoft.com/office/drawing/2010/main">
+                <a:solidFill>
+                  <a:srgbClr val="FFFFFF"/>
+                </a:solidFill>
+              </a14:hiddenFill>
+            </a:ext>
+          </a:extLst>
+        </p:spPr>
+      </p:pic>
+      <p:pic>
+        <p:nvPicPr>
+          <p:cNvPr id="43" name="Picture 6" descr="A Simplified, Yet Complex Solution (221B Baker Street) – Northern Dice">
+            <a:extLst>
+              <a:ext uri="{FF2B5EF4-FFF2-40B4-BE49-F238E27FC236}">
+                <a16:creationId xmlns:a16="http://schemas.microsoft.com/office/drawing/2014/main" id="{0A99EDB9-1A23-7642-422F-0ED791CA3B67}"/>
+              </a:ext>
+            </a:extLst>
+          </p:cNvPr>
+          <p:cNvPicPr>
+            <a:picLocks noChangeAspect="1" noChangeArrowheads="1"/>
+          </p:cNvPicPr>
+          <p:nvPr/>
+        </p:nvPicPr>
+        <p:blipFill rotWithShape="1">
+          <a:blip r:embed="rId2">
+            <a:extLst>
+              <a:ext uri="{28A0092B-C50C-407E-A947-70E740481C1C}">
+                <a14:useLocalDpi xmlns:a14="http://schemas.microsoft.com/office/drawing/2010/main" val="0"/>
+              </a:ext>
+            </a:extLst>
+          </a:blip>
+          <a:srcRect t="26128"/>
+          <a:stretch>
+            <a:fillRect/>
+          </a:stretch>
+        </p:blipFill>
+        <p:spPr bwMode="auto">
+          <a:xfrm>
+            <a:off x="1747736" y="-431148"/>
+            <a:ext cx="2181198" cy="1089497"/>
+          </a:xfrm>
+          <a:prstGeom prst="rect">
+            <a:avLst/>
+          </a:prstGeom>
+          <a:noFill/>
+          <a:extLst>
+            <a:ext uri="{909E8E84-426E-40DD-AFC4-6F175D3DCCD1}">
+              <a14:hiddenFill xmlns:a14="http://schemas.microsoft.com/office/drawing/2010/main">
+                <a:solidFill>
+                  <a:srgbClr val="FFFFFF"/>
+                </a:solidFill>
+              </a14:hiddenFill>
+            </a:ext>
+          </a:extLst>
+        </p:spPr>
+      </p:pic>
+      <p:pic>
+        <p:nvPicPr>
+          <p:cNvPr id="44" name="Picture 6" descr="A Simplified, Yet Complex Solution (221B Baker Street) – Northern Dice">
+            <a:extLst>
+              <a:ext uri="{FF2B5EF4-FFF2-40B4-BE49-F238E27FC236}">
+                <a16:creationId xmlns:a16="http://schemas.microsoft.com/office/drawing/2014/main" id="{D9CCE549-E9F2-38B8-ADA9-4A89767B17EC}"/>
+              </a:ext>
+            </a:extLst>
+          </p:cNvPr>
+          <p:cNvPicPr>
+            <a:picLocks noChangeAspect="1" noChangeArrowheads="1"/>
+          </p:cNvPicPr>
+          <p:nvPr/>
+        </p:nvPicPr>
+        <p:blipFill rotWithShape="1">
+          <a:blip r:embed="rId2">
+            <a:extLst>
+              <a:ext uri="{28A0092B-C50C-407E-A947-70E740481C1C}">
+                <a14:useLocalDpi xmlns:a14="http://schemas.microsoft.com/office/drawing/2010/main" val="0"/>
+              </a:ext>
+            </a:extLst>
+          </a:blip>
+          <a:srcRect t="26128"/>
+          <a:stretch>
+            <a:fillRect/>
+          </a:stretch>
+        </p:blipFill>
+        <p:spPr bwMode="auto">
+          <a:xfrm>
+            <a:off x="8248934" y="-431149"/>
+            <a:ext cx="2181198" cy="1089497"/>
+          </a:xfrm>
+          <a:prstGeom prst="rect">
+            <a:avLst/>
+          </a:prstGeom>
+          <a:noFill/>
+          <a:extLst>
+            <a:ext uri="{909E8E84-426E-40DD-AFC4-6F175D3DCCD1}">
+              <a14:hiddenFill xmlns:a14="http://schemas.microsoft.com/office/drawing/2010/main">
+                <a:solidFill>
+                  <a:srgbClr val="FFFFFF"/>
+                </a:solidFill>
+              </a14:hiddenFill>
+            </a:ext>
+          </a:extLst>
+        </p:spPr>
+      </p:pic>
+      <p:pic>
+        <p:nvPicPr>
+          <p:cNvPr id="45" name="Picture 6" descr="A Simplified, Yet Complex Solution (221B Baker Street) – Northern Dice">
+            <a:extLst>
+              <a:ext uri="{FF2B5EF4-FFF2-40B4-BE49-F238E27FC236}">
+                <a16:creationId xmlns:a16="http://schemas.microsoft.com/office/drawing/2014/main" id="{6D29D005-E2D2-41EC-54A8-F4C3F3D463FC}"/>
+              </a:ext>
+            </a:extLst>
+          </p:cNvPr>
+          <p:cNvPicPr>
+            <a:picLocks noChangeAspect="1" noChangeArrowheads="1"/>
+          </p:cNvPicPr>
+          <p:nvPr/>
+        </p:nvPicPr>
+        <p:blipFill rotWithShape="1">
+          <a:blip r:embed="rId2">
+            <a:extLst>
+              <a:ext uri="{28A0092B-C50C-407E-A947-70E740481C1C}">
+                <a14:useLocalDpi xmlns:a14="http://schemas.microsoft.com/office/drawing/2010/main" val="0"/>
+              </a:ext>
+            </a:extLst>
+          </a:blip>
+          <a:srcRect t="26128"/>
+          <a:stretch>
+            <a:fillRect/>
+          </a:stretch>
+        </p:blipFill>
+        <p:spPr bwMode="auto">
+          <a:xfrm>
+            <a:off x="10401868" y="-431146"/>
+            <a:ext cx="2181198" cy="1089497"/>
+          </a:xfrm>
+          <a:prstGeom prst="rect">
+            <a:avLst/>
+          </a:prstGeom>
+          <a:noFill/>
+          <a:extLst>
+            <a:ext uri="{909E8E84-426E-40DD-AFC4-6F175D3DCCD1}">
+              <a14:hiddenFill xmlns:a14="http://schemas.microsoft.com/office/drawing/2010/main">
+                <a:solidFill>
+                  <a:srgbClr val="FFFFFF"/>
+                </a:solidFill>
+              </a14:hiddenFill>
+            </a:ext>
+          </a:extLst>
+        </p:spPr>
+      </p:pic>
+      <p:sp>
+        <p:nvSpPr>
+          <p:cNvPr id="57" name="Rectangle 56">
+            <a:extLst>
+              <a:ext uri="{FF2B5EF4-FFF2-40B4-BE49-F238E27FC236}">
+                <a16:creationId xmlns:a16="http://schemas.microsoft.com/office/drawing/2014/main" id="{999A36E1-5D5C-8604-4EAA-901213F1421D}"/>
+              </a:ext>
+            </a:extLst>
+          </p:cNvPr>
+          <p:cNvSpPr/>
+          <p:nvPr/>
+        </p:nvSpPr>
+        <p:spPr>
+          <a:xfrm>
+            <a:off x="1527844" y="2141033"/>
+            <a:ext cx="6991013" cy="1287967"/>
+          </a:xfrm>
+          <a:prstGeom prst="rect">
+            <a:avLst/>
+          </a:prstGeom>
+          <a:solidFill>
+            <a:srgbClr val="051421">
+              <a:alpha val="60000"/>
+            </a:srgbClr>
+          </a:solidFill>
+          <a:ln>
+            <a:solidFill>
+              <a:srgbClr val="051421"/>
+            </a:solidFill>
+          </a:ln>
+        </p:spPr>
+        <p:style>
+          <a:lnRef idx="2">
+            <a:schemeClr val="accent1">
+              <a:shade val="15000"/>
+            </a:schemeClr>
+          </a:lnRef>
+          <a:fillRef idx="1">
+            <a:schemeClr val="accent1"/>
+          </a:fillRef>
+          <a:effectRef idx="0">
+            <a:schemeClr val="accent1"/>
+          </a:effectRef>
+          <a:fontRef idx="minor">
+            <a:schemeClr val="lt1"/>
+          </a:fontRef>
+        </p:style>
+        <p:txBody>
+          <a:bodyPr rtlCol="0" anchor="ctr"/>
+          <a:lstStyle/>
+          <a:p>
+            <a:pPr algn="ctr"/>
+            <a:endParaRPr lang="en-GB"/>
+          </a:p>
+        </p:txBody>
+      </p:sp>
+      <p:sp>
+        <p:nvSpPr>
+          <p:cNvPr id="58" name="Rectangle 57">
+            <a:extLst>
+              <a:ext uri="{FF2B5EF4-FFF2-40B4-BE49-F238E27FC236}">
+                <a16:creationId xmlns:a16="http://schemas.microsoft.com/office/drawing/2014/main" id="{D702AB26-6EA6-1DF0-126D-2B21168CC88A}"/>
+              </a:ext>
+            </a:extLst>
+          </p:cNvPr>
+          <p:cNvSpPr/>
+          <p:nvPr/>
+        </p:nvSpPr>
+        <p:spPr>
+          <a:xfrm>
+            <a:off x="8511224" y="2140996"/>
+            <a:ext cx="2304000" cy="2305050"/>
+          </a:xfrm>
+          <a:prstGeom prst="rect">
+            <a:avLst/>
+          </a:prstGeom>
+          <a:solidFill>
+            <a:srgbClr val="051421">
+              <a:alpha val="60000"/>
+            </a:srgbClr>
+          </a:solidFill>
+          <a:ln>
+            <a:solidFill>
+              <a:schemeClr val="tx1"/>
+            </a:solidFill>
+          </a:ln>
+        </p:spPr>
+        <p:style>
+          <a:lnRef idx="2">
+            <a:schemeClr val="accent1">
+              <a:shade val="15000"/>
+            </a:schemeClr>
+          </a:lnRef>
+          <a:fillRef idx="1">
+            <a:schemeClr val="accent1"/>
+          </a:fillRef>
+          <a:effectRef idx="0">
+            <a:schemeClr val="accent1"/>
+          </a:effectRef>
+          <a:fontRef idx="minor">
+            <a:schemeClr val="lt1"/>
+          </a:fontRef>
+        </p:style>
+        <p:txBody>
+          <a:bodyPr rtlCol="0" anchor="ctr"/>
+          <a:lstStyle/>
+          <a:p>
+            <a:pPr algn="ctr"/>
+            <a:endParaRPr lang="en-GB"/>
+          </a:p>
+        </p:txBody>
+      </p:sp>
+      <p:sp>
+        <p:nvSpPr>
+          <p:cNvPr id="59" name="Rectangle 58">
+            <a:extLst>
+              <a:ext uri="{FF2B5EF4-FFF2-40B4-BE49-F238E27FC236}">
+                <a16:creationId xmlns:a16="http://schemas.microsoft.com/office/drawing/2014/main" id="{23888E32-2567-D80D-1632-8B29002CD6FC}"/>
+              </a:ext>
+            </a:extLst>
+          </p:cNvPr>
+          <p:cNvSpPr/>
+          <p:nvPr/>
+        </p:nvSpPr>
+        <p:spPr>
+          <a:xfrm>
+            <a:off x="1523933" y="3429000"/>
+            <a:ext cx="3495600" cy="1017046"/>
+          </a:xfrm>
+          <a:prstGeom prst="rect">
+            <a:avLst/>
+          </a:prstGeom>
+          <a:solidFill>
+            <a:srgbClr val="051421">
+              <a:alpha val="60000"/>
+            </a:srgbClr>
+          </a:solidFill>
+          <a:ln>
+            <a:solidFill>
+              <a:srgbClr val="051421"/>
+            </a:solidFill>
+          </a:ln>
+        </p:spPr>
+        <p:style>
+          <a:lnRef idx="2">
+            <a:schemeClr val="accent1">
+              <a:shade val="15000"/>
+            </a:schemeClr>
+          </a:lnRef>
+          <a:fillRef idx="1">
+            <a:schemeClr val="accent1"/>
+          </a:fillRef>
+          <a:effectRef idx="0">
+            <a:schemeClr val="accent1"/>
+          </a:effectRef>
+          <a:fontRef idx="minor">
+            <a:schemeClr val="lt1"/>
+          </a:fontRef>
+        </p:style>
+        <p:txBody>
+          <a:bodyPr rtlCol="0" anchor="ctr"/>
+          <a:lstStyle/>
+          <a:p>
+            <a:pPr algn="ctr"/>
+            <a:endParaRPr lang="en-GB"/>
+          </a:p>
+        </p:txBody>
+      </p:sp>
+      <p:sp>
+        <p:nvSpPr>
+          <p:cNvPr id="60" name="Rectangle 59">
+            <a:extLst>
+              <a:ext uri="{FF2B5EF4-FFF2-40B4-BE49-F238E27FC236}">
+                <a16:creationId xmlns:a16="http://schemas.microsoft.com/office/drawing/2014/main" id="{658D5FC3-E6E7-2F8C-CA17-294620E58399}"/>
+              </a:ext>
+            </a:extLst>
+          </p:cNvPr>
+          <p:cNvSpPr/>
+          <p:nvPr/>
+        </p:nvSpPr>
+        <p:spPr>
+          <a:xfrm>
+            <a:off x="5013669" y="3429000"/>
+            <a:ext cx="3495600" cy="1017046"/>
+          </a:xfrm>
+          <a:prstGeom prst="rect">
+            <a:avLst/>
+          </a:prstGeom>
+          <a:solidFill>
+            <a:srgbClr val="051421">
+              <a:alpha val="60000"/>
+            </a:srgbClr>
+          </a:solidFill>
+          <a:ln>
+            <a:solidFill>
+              <a:srgbClr val="051421"/>
+            </a:solidFill>
+          </a:ln>
+        </p:spPr>
+        <p:style>
+          <a:lnRef idx="2">
+            <a:schemeClr val="accent1">
+              <a:shade val="15000"/>
+            </a:schemeClr>
+          </a:lnRef>
+          <a:fillRef idx="1">
+            <a:schemeClr val="accent1"/>
+          </a:fillRef>
+          <a:effectRef idx="0">
+            <a:schemeClr val="accent1"/>
+          </a:effectRef>
+          <a:fontRef idx="minor">
+            <a:schemeClr val="lt1"/>
+          </a:fontRef>
+        </p:style>
+        <p:txBody>
+          <a:bodyPr rtlCol="0" anchor="ctr"/>
+          <a:lstStyle/>
+          <a:p>
+            <a:pPr algn="ctr"/>
+            <a:endParaRPr lang="en-GB"/>
+          </a:p>
+        </p:txBody>
+      </p:sp>
+      <p:sp>
+        <p:nvSpPr>
+          <p:cNvPr id="61" name="Rectangle 60">
+            <a:extLst>
+              <a:ext uri="{FF2B5EF4-FFF2-40B4-BE49-F238E27FC236}">
+                <a16:creationId xmlns:a16="http://schemas.microsoft.com/office/drawing/2014/main" id="{4B725796-47BA-A1B3-2151-CDD65D90C147}"/>
+              </a:ext>
+            </a:extLst>
+          </p:cNvPr>
+          <p:cNvSpPr/>
+          <p:nvPr/>
+        </p:nvSpPr>
+        <p:spPr>
+          <a:xfrm>
+            <a:off x="1529799" y="2141033"/>
+            <a:ext cx="6991013" cy="1287967"/>
+          </a:xfrm>
+          <a:prstGeom prst="rect">
+            <a:avLst/>
+          </a:prstGeom>
+          <a:solidFill>
+            <a:srgbClr val="051421">
+              <a:alpha val="60000"/>
+            </a:srgbClr>
+          </a:solidFill>
+          <a:ln>
+            <a:solidFill>
+              <a:schemeClr val="tx1"/>
+            </a:solidFill>
+          </a:ln>
+        </p:spPr>
+        <p:style>
+          <a:lnRef idx="2">
+            <a:schemeClr val="accent1">
+              <a:shade val="15000"/>
+            </a:schemeClr>
+          </a:lnRef>
+          <a:fillRef idx="1">
+            <a:schemeClr val="accent1"/>
+          </a:fillRef>
+          <a:effectRef idx="0">
+            <a:schemeClr val="accent1"/>
+          </a:effectRef>
+          <a:fontRef idx="minor">
+            <a:schemeClr val="lt1"/>
+          </a:fontRef>
+        </p:style>
+        <p:txBody>
+          <a:bodyPr rtlCol="0" anchor="ctr"/>
+          <a:lstStyle/>
+          <a:p>
+            <a:pPr algn="ctr"/>
+            <a:endParaRPr lang="en-GB"/>
+          </a:p>
+        </p:txBody>
+      </p:sp>
+      <p:sp>
+        <p:nvSpPr>
+          <p:cNvPr id="62" name="Rectangle 61">
+            <a:extLst>
+              <a:ext uri="{FF2B5EF4-FFF2-40B4-BE49-F238E27FC236}">
+                <a16:creationId xmlns:a16="http://schemas.microsoft.com/office/drawing/2014/main" id="{69CC274C-1638-C176-3525-A10C4F264B01}"/>
+              </a:ext>
+            </a:extLst>
+          </p:cNvPr>
+          <p:cNvSpPr/>
+          <p:nvPr/>
+        </p:nvSpPr>
+        <p:spPr>
+          <a:xfrm>
+            <a:off x="1525888" y="3429000"/>
+            <a:ext cx="3495600" cy="1017046"/>
+          </a:xfrm>
+          <a:prstGeom prst="rect">
+            <a:avLst/>
+          </a:prstGeom>
+          <a:solidFill>
+            <a:srgbClr val="051421">
+              <a:alpha val="60000"/>
+            </a:srgbClr>
+          </a:solidFill>
+          <a:ln>
+            <a:solidFill>
+              <a:schemeClr val="tx1"/>
+            </a:solidFill>
+          </a:ln>
+        </p:spPr>
+        <p:style>
+          <a:lnRef idx="2">
+            <a:schemeClr val="accent1">
+              <a:shade val="15000"/>
+            </a:schemeClr>
+          </a:lnRef>
+          <a:fillRef idx="1">
+            <a:schemeClr val="accent1"/>
+          </a:fillRef>
+          <a:effectRef idx="0">
+            <a:schemeClr val="accent1"/>
+          </a:effectRef>
+          <a:fontRef idx="minor">
+            <a:schemeClr val="lt1"/>
+          </a:fontRef>
+        </p:style>
+        <p:txBody>
+          <a:bodyPr rtlCol="0" anchor="ctr"/>
+          <a:lstStyle/>
+          <a:p>
+            <a:pPr algn="ctr"/>
+            <a:endParaRPr lang="en-GB"/>
+          </a:p>
+        </p:txBody>
+      </p:sp>
+      <p:sp>
+        <p:nvSpPr>
+          <p:cNvPr id="63" name="Rectangle 62">
+            <a:extLst>
+              <a:ext uri="{FF2B5EF4-FFF2-40B4-BE49-F238E27FC236}">
+                <a16:creationId xmlns:a16="http://schemas.microsoft.com/office/drawing/2014/main" id="{C640ACFC-5476-6496-8531-DA8EC8D548E4}"/>
+              </a:ext>
+            </a:extLst>
+          </p:cNvPr>
+          <p:cNvSpPr/>
+          <p:nvPr/>
+        </p:nvSpPr>
+        <p:spPr>
+          <a:xfrm>
+            <a:off x="5015624" y="3429000"/>
+            <a:ext cx="3495600" cy="1017046"/>
+          </a:xfrm>
+          <a:prstGeom prst="rect">
+            <a:avLst/>
+          </a:prstGeom>
+          <a:solidFill>
+            <a:srgbClr val="051421">
+              <a:alpha val="60000"/>
+            </a:srgbClr>
+          </a:solidFill>
+          <a:ln>
+            <a:solidFill>
+              <a:schemeClr val="tx1"/>
+            </a:solidFill>
+          </a:ln>
+        </p:spPr>
+        <p:style>
+          <a:lnRef idx="2">
+            <a:schemeClr val="accent1">
+              <a:shade val="15000"/>
+            </a:schemeClr>
+          </a:lnRef>
+          <a:fillRef idx="1">
+            <a:schemeClr val="accent1"/>
+          </a:fillRef>
+          <a:effectRef idx="0">
+            <a:schemeClr val="accent1"/>
+          </a:effectRef>
+          <a:fontRef idx="minor">
+            <a:schemeClr val="lt1"/>
+          </a:fontRef>
+        </p:style>
+        <p:txBody>
+          <a:bodyPr rtlCol="0" anchor="ctr"/>
+          <a:lstStyle/>
+          <a:p>
+            <a:pPr algn="ctr"/>
+            <a:endParaRPr lang="en-GB"/>
+          </a:p>
+        </p:txBody>
+      </p:sp>
+      <p:sp>
+        <p:nvSpPr>
+          <p:cNvPr id="64" name="Rectangle 63">
+            <a:extLst>
+              <a:ext uri="{FF2B5EF4-FFF2-40B4-BE49-F238E27FC236}">
+                <a16:creationId xmlns:a16="http://schemas.microsoft.com/office/drawing/2014/main" id="{A86B0F94-4F90-8DBC-E482-6520110DC8A8}"/>
+              </a:ext>
+            </a:extLst>
+          </p:cNvPr>
+          <p:cNvSpPr/>
+          <p:nvPr/>
+        </p:nvSpPr>
+        <p:spPr>
+          <a:xfrm>
+            <a:off x="8481003" y="2140962"/>
+            <a:ext cx="2703240" cy="1569660"/>
+          </a:xfrm>
+          <a:prstGeom prst="rect">
+            <a:avLst/>
+          </a:prstGeom>
+          <a:noFill/>
+        </p:spPr>
+        <p:txBody>
+          <a:bodyPr wrap="square" lIns="91440" tIns="45720" rIns="91440" bIns="45720">
+            <a:spAutoFit/>
+          </a:bodyPr>
+          <a:lstStyle/>
+          <a:p>
+            <a:r>
+              <a:rPr lang="en-US" sz="4800" b="1" cap="none" spc="0" dirty="0">
+                <a:ln w="0"/>
+                <a:solidFill>
+                  <a:schemeClr val="bg1"/>
+                </a:solidFill>
+                <a:effectLst>
+                  <a:outerShdw blurRad="38100" dist="19050" dir="2700000" algn="tl" rotWithShape="0">
+                    <a:schemeClr val="dk1">
+                      <a:alpha val="40000"/>
+                    </a:schemeClr>
+                  </a:outerShdw>
+                </a:effectLst>
+              </a:rPr>
+              <a:t>CREATE </a:t>
+            </a:r>
+          </a:p>
+          <a:p>
+            <a:r>
+              <a:rPr lang="en-US" sz="4800" b="1" cap="none" spc="0" dirty="0">
+                <a:ln w="0"/>
+                <a:solidFill>
+                  <a:schemeClr val="bg1"/>
+                </a:solidFill>
+                <a:effectLst>
+                  <a:outerShdw blurRad="38100" dist="19050" dir="2700000" algn="tl" rotWithShape="0">
+                    <a:schemeClr val="dk1">
+                      <a:alpha val="40000"/>
+                    </a:schemeClr>
+                  </a:outerShdw>
+                </a:effectLst>
+              </a:rPr>
+              <a:t>GAME</a:t>
+            </a:r>
+          </a:p>
+        </p:txBody>
+      </p:sp>
+      <p:sp>
+        <p:nvSpPr>
+          <p:cNvPr id="65" name="Arrow: Right 64">
+            <a:extLst>
+              <a:ext uri="{FF2B5EF4-FFF2-40B4-BE49-F238E27FC236}">
+                <a16:creationId xmlns:a16="http://schemas.microsoft.com/office/drawing/2014/main" id="{0E5D1490-6B85-6912-52E4-495A7E4A5F2A}"/>
+              </a:ext>
+            </a:extLst>
+          </p:cNvPr>
+          <p:cNvSpPr/>
+          <p:nvPr/>
+        </p:nvSpPr>
+        <p:spPr>
+          <a:xfrm>
+            <a:off x="8660396" y="3633872"/>
+            <a:ext cx="632426" cy="723900"/>
+          </a:xfrm>
+          <a:prstGeom prst="rightArrow">
+            <a:avLst/>
+          </a:prstGeom>
+          <a:solidFill>
+            <a:schemeClr val="bg1"/>
+          </a:solidFill>
+        </p:spPr>
+        <p:style>
+          <a:lnRef idx="2">
+            <a:schemeClr val="accent1">
+              <a:shade val="15000"/>
+            </a:schemeClr>
+          </a:lnRef>
+          <a:fillRef idx="1">
+            <a:schemeClr val="accent1"/>
+          </a:fillRef>
+          <a:effectRef idx="0">
+            <a:schemeClr val="accent1"/>
+          </a:effectRef>
+          <a:fontRef idx="minor">
+            <a:schemeClr val="lt1"/>
+          </a:fontRef>
+        </p:style>
+        <p:txBody>
+          <a:bodyPr rtlCol="0" anchor="ctr"/>
+          <a:lstStyle/>
+          <a:p>
+            <a:pPr algn="ctr"/>
+            <a:endParaRPr lang="en-GB"/>
+          </a:p>
+        </p:txBody>
+      </p:sp>
+      <p:sp>
+        <p:nvSpPr>
+          <p:cNvPr id="66" name="Rectangle 65">
+            <a:extLst>
+              <a:ext uri="{FF2B5EF4-FFF2-40B4-BE49-F238E27FC236}">
+                <a16:creationId xmlns:a16="http://schemas.microsoft.com/office/drawing/2014/main" id="{3837FC07-4B3E-D4FD-AEF9-8032ECBD20ED}"/>
+              </a:ext>
+            </a:extLst>
+          </p:cNvPr>
+          <p:cNvSpPr/>
+          <p:nvPr/>
+        </p:nvSpPr>
+        <p:spPr>
+          <a:xfrm>
+            <a:off x="1519735" y="2231018"/>
+            <a:ext cx="6971332" cy="1107996"/>
+          </a:xfrm>
+          <a:prstGeom prst="rect">
+            <a:avLst/>
+          </a:prstGeom>
+          <a:noFill/>
+        </p:spPr>
+        <p:txBody>
+          <a:bodyPr wrap="none" lIns="91440" tIns="45720" rIns="91440" bIns="45720">
+            <a:spAutoFit/>
+          </a:bodyPr>
+          <a:lstStyle/>
+          <a:p>
+            <a:pPr algn="ctr"/>
+            <a:r>
+              <a:rPr lang="en-US" sz="6600" b="1" cap="none" spc="0" dirty="0">
+                <a:ln w="0"/>
+                <a:solidFill>
+                  <a:schemeClr val="bg1"/>
+                </a:solidFill>
+                <a:effectLst>
+                  <a:outerShdw blurRad="38100" dist="19050" dir="2700000" algn="tl" rotWithShape="0">
+                    <a:schemeClr val="dk1">
+                      <a:alpha val="40000"/>
+                    </a:schemeClr>
+                  </a:outerShdw>
+                </a:effectLst>
+              </a:rPr>
+              <a:t>221B Baker Street</a:t>
+            </a:r>
+          </a:p>
+        </p:txBody>
+      </p:sp>
+      <p:sp>
+        <p:nvSpPr>
+          <p:cNvPr id="67" name="Rectangle 66">
+            <a:extLst>
+              <a:ext uri="{FF2B5EF4-FFF2-40B4-BE49-F238E27FC236}">
+                <a16:creationId xmlns:a16="http://schemas.microsoft.com/office/drawing/2014/main" id="{BB32DD8A-341A-2206-7A96-C13EF33085EB}"/>
+              </a:ext>
+            </a:extLst>
+          </p:cNvPr>
+          <p:cNvSpPr/>
+          <p:nvPr/>
+        </p:nvSpPr>
+        <p:spPr>
+          <a:xfrm>
+            <a:off x="5375864" y="3475858"/>
+            <a:ext cx="2775119" cy="923330"/>
+          </a:xfrm>
+          <a:prstGeom prst="rect">
+            <a:avLst/>
+          </a:prstGeom>
+          <a:noFill/>
+        </p:spPr>
+        <p:txBody>
+          <a:bodyPr wrap="none" lIns="91440" tIns="45720" rIns="91440" bIns="45720">
+            <a:spAutoFit/>
+          </a:bodyPr>
+          <a:lstStyle/>
+          <a:p>
+            <a:pPr algn="ctr"/>
+            <a:r>
+              <a:rPr lang="en-US" sz="5400" b="1" cap="none" spc="0" dirty="0">
+                <a:ln w="0"/>
+                <a:solidFill>
+                  <a:schemeClr val="bg1"/>
+                </a:solidFill>
+                <a:effectLst>
+                  <a:outerShdw blurRad="38100" dist="19050" dir="2700000" algn="tl" rotWithShape="0">
+                    <a:schemeClr val="dk1">
+                      <a:alpha val="40000"/>
+                    </a:schemeClr>
+                  </a:outerShdw>
+                </a:effectLst>
+              </a:rPr>
+              <a:t>Settings</a:t>
+            </a:r>
+          </a:p>
+        </p:txBody>
+      </p:sp>
+      <p:sp>
+        <p:nvSpPr>
+          <p:cNvPr id="68" name="Rectangle 67">
+            <a:extLst>
+              <a:ext uri="{FF2B5EF4-FFF2-40B4-BE49-F238E27FC236}">
+                <a16:creationId xmlns:a16="http://schemas.microsoft.com/office/drawing/2014/main" id="{43F0F2E7-0CD9-531A-7725-1713158486E8}"/>
+              </a:ext>
+            </a:extLst>
+          </p:cNvPr>
+          <p:cNvSpPr/>
+          <p:nvPr/>
+        </p:nvSpPr>
+        <p:spPr>
+          <a:xfrm>
+            <a:off x="1473291" y="3465265"/>
+            <a:ext cx="3612336" cy="923330"/>
+          </a:xfrm>
+          <a:prstGeom prst="rect">
+            <a:avLst/>
+          </a:prstGeom>
+          <a:noFill/>
+        </p:spPr>
+        <p:txBody>
+          <a:bodyPr wrap="none" lIns="91440" tIns="45720" rIns="91440" bIns="45720">
+            <a:spAutoFit/>
+          </a:bodyPr>
+          <a:lstStyle/>
+          <a:p>
+            <a:pPr algn="ctr"/>
+            <a:r>
+              <a:rPr lang="en-GB" sz="5400" b="1" cap="none" spc="0" noProof="0" dirty="0">
+                <a:ln w="0"/>
+                <a:solidFill>
+                  <a:schemeClr val="bg1"/>
+                </a:solidFill>
+                <a:effectLst>
+                  <a:outerShdw blurRad="38100" dist="19050" dir="2700000" algn="tl" rotWithShape="0">
+                    <a:schemeClr val="dk1">
+                      <a:alpha val="40000"/>
+                    </a:schemeClr>
+                  </a:outerShdw>
+                </a:effectLst>
+              </a:rPr>
+              <a:t>Customise</a:t>
+            </a:r>
+          </a:p>
+        </p:txBody>
+      </p:sp>
+    </p:spTree>
+    <p:extLst>
+      <p:ext uri="{BB962C8B-B14F-4D97-AF65-F5344CB8AC3E}">
+        <p14:creationId xmlns:p14="http://schemas.microsoft.com/office/powerpoint/2010/main" val="2321344408"/>
+      </p:ext>
+    </p:extLst>
+  </p:cSld>
+  <p:clrMapOvr>
+    <a:masterClrMapping/>
+  </p:clrMapOvr>
+</p:sld>
+</file>
+
+<file path=ppt/slides/slide2.xml><?xml version="1.0" encoding="utf-8"?>
 <p:sld xmlns:a="http://schemas.openxmlformats.org/drawingml/2006/main" xmlns:r="http://schemas.openxmlformats.org/officeDocument/2006/relationships" xmlns:p="http://schemas.openxmlformats.org/presentationml/2006/main">
   <p:cSld>
     <p:spTree>

</xml_diff>